<commit_message>
feat: Add necessary endpoints and configurations
</commit_message>
<xml_diff>
--- a/Presentation.pptx
+++ b/Presentation.pptx
@@ -2,12 +2,22 @@
 <file path=ppt/presentation.xml><?xml version="1.0" encoding="utf-8"?>
 <p:presentation xmlns:a="http://schemas.openxmlformats.org/drawingml/2006/main" xmlns:r="http://schemas.openxmlformats.org/officeDocument/2006/relationships" xmlns:p="http://schemas.openxmlformats.org/presentationml/2006/main" saveSubsetFonts="1">
   <p:sldMasterIdLst>
-    <p:sldMasterId id="2147483672" r:id="rId1"/>
+    <p:sldMasterId id="2147483732" r:id="rId1"/>
   </p:sldMasterIdLst>
   <p:sldIdLst>
-    <p:sldId id="256" r:id="rId2"/>
-    <p:sldId id="257" r:id="rId3"/>
-    <p:sldId id="259" r:id="rId4"/>
+    <p:sldId id="257" r:id="rId2"/>
+    <p:sldId id="268" r:id="rId3"/>
+    <p:sldId id="269" r:id="rId4"/>
+    <p:sldId id="270" r:id="rId5"/>
+    <p:sldId id="259" r:id="rId6"/>
+    <p:sldId id="261" r:id="rId7"/>
+    <p:sldId id="267" r:id="rId8"/>
+    <p:sldId id="262" r:id="rId9"/>
+    <p:sldId id="258" r:id="rId10"/>
+    <p:sldId id="263" r:id="rId11"/>
+    <p:sldId id="265" r:id="rId12"/>
+    <p:sldId id="264" r:id="rId13"/>
+    <p:sldId id="266" r:id="rId14"/>
   </p:sldIdLst>
   <p:sldSz cx="12192000" cy="6858000"/>
   <p:notesSz cx="6858000" cy="9144000"/>
@@ -118,6 +128,7 @@
 <p1510:revInfo xmlns:a="http://schemas.openxmlformats.org/drawingml/2006/main" xmlns:r="http://schemas.openxmlformats.org/officeDocument/2006/relationships" xmlns:p1510="http://schemas.microsoft.com/office/powerpoint/2015/10/main">
   <p1510:revLst>
     <p1510:client id="{3E2C3630-3B86-49EF-BCAF-EA34D66324CE}" v="156" dt="2025-01-11T20:05:43.712"/>
+    <p1510:client id="{FBE8E217-E5D1-B6EC-466B-B7321C1AE0A8}" v="163" dt="2025-01-12T00:32:09.395"/>
   </p1510:revLst>
 </p1510:revInfo>
 </file>
@@ -144,7 +155,7 @@
           <p:cNvPr id="2" name="Title 1">
             <a:extLst>
               <a:ext uri="{FF2B5EF4-FFF2-40B4-BE49-F238E27FC236}">
-                <a16:creationId xmlns:a16="http://schemas.microsoft.com/office/drawing/2014/main" id="{898DE6C8-AB1D-4204-BC9C-3366B0BF0435}"/>
+                <a16:creationId xmlns:a16="http://schemas.microsoft.com/office/drawing/2014/main" id="{E4336E9A-8E96-CD8C-7598-F87632CD81CF}"/>
               </a:ext>
             </a:extLst>
           </p:cNvPr>
@@ -157,47 +168,8 @@
         </p:nvSpPr>
         <p:spPr>
           <a:xfrm>
-            <a:off x="678426" y="889820"/>
-            <a:ext cx="9989574" cy="3598606"/>
-          </a:xfrm>
-        </p:spPr>
-        <p:txBody>
-          <a:bodyPr anchor="t">
-            <a:normAutofit/>
-          </a:bodyPr>
-          <a:lstStyle>
-            <a:lvl1pPr algn="l">
-              <a:defRPr sz="5400"/>
-            </a:lvl1pPr>
-          </a:lstStyle>
-          <a:p>
-            <a:r>
-              <a:rPr lang="en-US" dirty="0"/>
-              <a:t>Click to edit Master title style</a:t>
-            </a:r>
-          </a:p>
-        </p:txBody>
-      </p:sp>
-      <p:sp>
-        <p:nvSpPr>
-          <p:cNvPr id="3" name="Subtitle 2">
-            <a:extLst>
-              <a:ext uri="{FF2B5EF4-FFF2-40B4-BE49-F238E27FC236}">
-                <a16:creationId xmlns:a16="http://schemas.microsoft.com/office/drawing/2014/main" id="{7A7B9009-EE50-4EE5-B6EB-CD6EC83D3FA3}"/>
-              </a:ext>
-            </a:extLst>
-          </p:cNvPr>
-          <p:cNvSpPr>
-            <a:spLocks noGrp="1"/>
-          </p:cNvSpPr>
-          <p:nvPr>
-            <p:ph type="subTitle" idx="1"/>
-          </p:nvPr>
-        </p:nvSpPr>
-        <p:spPr>
-          <a:xfrm>
-            <a:off x="678426" y="4488426"/>
-            <a:ext cx="6991776" cy="1302774"/>
+            <a:off x="2301923" y="1122363"/>
+            <a:ext cx="7588155" cy="2621154"/>
           </a:xfrm>
         </p:spPr>
         <p:txBody>
@@ -205,13 +177,52 @@
             <a:normAutofit/>
           </a:bodyPr>
           <a:lstStyle>
-            <a:lvl1pPr marL="0" indent="0" algn="l">
-              <a:buNone/>
-              <a:defRPr sz="2000"/>
+            <a:lvl1pPr algn="ctr">
+              <a:defRPr sz="4000"/>
+            </a:lvl1pPr>
+          </a:lstStyle>
+          <a:p>
+            <a:r>
+              <a:rPr lang="en-US" dirty="0"/>
+              <a:t>Click to edit Master title style</a:t>
+            </a:r>
+          </a:p>
+        </p:txBody>
+      </p:sp>
+      <p:sp>
+        <p:nvSpPr>
+          <p:cNvPr id="3" name="Subtitle 2">
+            <a:extLst>
+              <a:ext uri="{FF2B5EF4-FFF2-40B4-BE49-F238E27FC236}">
+                <a16:creationId xmlns:a16="http://schemas.microsoft.com/office/drawing/2014/main" id="{2BDC76B8-60F6-62D3-9F73-E81662203017}"/>
+              </a:ext>
+            </a:extLst>
+          </p:cNvPr>
+          <p:cNvSpPr>
+            <a:spLocks noGrp="1"/>
+          </p:cNvSpPr>
+          <p:nvPr>
+            <p:ph type="subTitle" idx="1"/>
+          </p:nvPr>
+        </p:nvSpPr>
+        <p:spPr>
+          <a:xfrm>
+            <a:off x="2301923" y="3843708"/>
+            <a:ext cx="7588155" cy="1414091"/>
+          </a:xfrm>
+        </p:spPr>
+        <p:txBody>
+          <a:bodyPr>
+            <a:normAutofit/>
+          </a:bodyPr>
+          <a:lstStyle>
+            <a:lvl1pPr marL="0" indent="0" algn="ctr">
+              <a:buNone/>
+              <a:defRPr sz="1800"/>
             </a:lvl1pPr>
             <a:lvl2pPr marL="457200" indent="0" algn="ctr">
               <a:buNone/>
-              <a:defRPr sz="2000"/>
+              <a:defRPr sz="1800"/>
             </a:lvl2pPr>
             <a:lvl3pPr marL="914400" indent="0" algn="ctr">
               <a:buNone/>
@@ -255,7 +266,7 @@
           <p:cNvPr id="4" name="Date Placeholder 3">
             <a:extLst>
               <a:ext uri="{FF2B5EF4-FFF2-40B4-BE49-F238E27FC236}">
-                <a16:creationId xmlns:a16="http://schemas.microsoft.com/office/drawing/2014/main" id="{99C8667E-058A-436F-B8EA-5B3A99D43D09}"/>
+                <a16:creationId xmlns:a16="http://schemas.microsoft.com/office/drawing/2014/main" id="{EAE2DAFA-435E-AAF9-8B67-495E5AFDCD91}"/>
               </a:ext>
             </a:extLst>
           </p:cNvPr>
@@ -271,7 +282,7 @@
           <a:bodyPr/>
           <a:lstStyle/>
           <a:p>
-            <a:fld id="{12575099-B3AD-44D7-919B-BCB6DC3E7F21}" type="datetimeFigureOut">
+            <a:fld id="{77CA0979-F579-4E9B-A675-1F5ABBFF00DB}" type="datetimeFigureOut">
               <a:rPr lang="en-US" dirty="0"/>
               <a:t>1/11/2025</a:t>
             </a:fld>
@@ -284,7 +295,7 @@
           <p:cNvPr id="5" name="Footer Placeholder 4">
             <a:extLst>
               <a:ext uri="{FF2B5EF4-FFF2-40B4-BE49-F238E27FC236}">
-                <a16:creationId xmlns:a16="http://schemas.microsoft.com/office/drawing/2014/main" id="{52680305-1AD7-482D-BFFD-6CDB83AB39A4}"/>
+                <a16:creationId xmlns:a16="http://schemas.microsoft.com/office/drawing/2014/main" id="{5B407A58-3351-E479-1A0C-2FF49FA42707}"/>
               </a:ext>
             </a:extLst>
           </p:cNvPr>
@@ -313,7 +324,7 @@
           <p:cNvPr id="6" name="Slide Number Placeholder 5">
             <a:extLst>
               <a:ext uri="{FF2B5EF4-FFF2-40B4-BE49-F238E27FC236}">
-                <a16:creationId xmlns:a16="http://schemas.microsoft.com/office/drawing/2014/main" id="{BE5762A1-52E9-402D-B65E-DF193E44CE83}"/>
+                <a16:creationId xmlns:a16="http://schemas.microsoft.com/office/drawing/2014/main" id="{81789E10-2433-2ECB-9C92-571B583A4CF1}"/>
               </a:ext>
             </a:extLst>
           </p:cNvPr>
@@ -329,7 +340,7 @@
           <a:bodyPr/>
           <a:lstStyle/>
           <a:p>
-            <a:fld id="{E30AF5A0-43BB-4336-8627-9123B9144D80}" type="slidenum">
+            <a:fld id="{CC057153-B650-4DEB-B370-79DDCFDCE934}" type="slidenum">
               <a:rPr lang="en-US" dirty="0"/>
               <a:t>‹#›</a:t>
             </a:fld>
@@ -340,7 +351,7 @@
     </p:spTree>
     <p:extLst>
       <p:ext uri="{BB962C8B-B14F-4D97-AF65-F5344CB8AC3E}">
-        <p14:creationId xmlns:p14="http://schemas.microsoft.com/office/powerpoint/2010/main" val="3464580430"/>
+        <p14:creationId xmlns:p14="http://schemas.microsoft.com/office/powerpoint/2010/main" val="2525965006"/>
       </p:ext>
     </p:extLst>
   </p:cSld>
@@ -349,7 +360,18 @@
   </p:clrMapOvr>
   <p:extLst>
     <p:ext uri="{DCECCB84-F9BA-43D5-87BE-67443E8EF086}">
-      <p15:sldGuideLst xmlns:p15="http://schemas.microsoft.com/office/powerpoint/2012/main"/>
+      <p15:sldGuideLst xmlns:p15="http://schemas.microsoft.com/office/powerpoint/2012/main">
+        <p15:guide id="5" orient="horz" pos="2160">
+          <p15:clr>
+            <a:srgbClr val="FBAE40"/>
+          </p15:clr>
+        </p15:guide>
+        <p15:guide id="6" pos="3840">
+          <p15:clr>
+            <a:srgbClr val="FBAE40"/>
+          </p15:clr>
+        </p15:guide>
+      </p15:sldGuideLst>
     </p:ext>
   </p:extLst>
 </p:sldLayout>
@@ -377,7 +399,7 @@
           <p:cNvPr id="2" name="Title 1">
             <a:extLst>
               <a:ext uri="{FF2B5EF4-FFF2-40B4-BE49-F238E27FC236}">
-                <a16:creationId xmlns:a16="http://schemas.microsoft.com/office/drawing/2014/main" id="{7D6359C1-C098-4BF4-A55D-782F4E606B8A}"/>
+                <a16:creationId xmlns:a16="http://schemas.microsoft.com/office/drawing/2014/main" id="{354E956D-CB73-C986-F100-46487310D11E}"/>
               </a:ext>
             </a:extLst>
           </p:cNvPr>
@@ -388,7 +410,12 @@
             <p:ph type="title"/>
           </p:nvPr>
         </p:nvSpPr>
-        <p:spPr/>
+        <p:spPr>
+          <a:xfrm>
+            <a:off x="612648" y="548640"/>
+            <a:ext cx="10515600" cy="1132258"/>
+          </a:xfrm>
+        </p:spPr>
         <p:txBody>
           <a:bodyPr/>
           <a:lstStyle/>
@@ -405,7 +432,7 @@
           <p:cNvPr id="3" name="Vertical Text Placeholder 2">
             <a:extLst>
               <a:ext uri="{FF2B5EF4-FFF2-40B4-BE49-F238E27FC236}">
-                <a16:creationId xmlns:a16="http://schemas.microsoft.com/office/drawing/2014/main" id="{3D343C7E-1E8B-4D38-9B81-1AA2A8978EDE}"/>
+                <a16:creationId xmlns:a16="http://schemas.microsoft.com/office/drawing/2014/main" id="{FE423E6A-A07C-BF0D-EA30-9A8A854E48F1}"/>
               </a:ext>
             </a:extLst>
           </p:cNvPr>
@@ -416,7 +443,12 @@
             <p:ph type="body" orient="vert" idx="1"/>
           </p:nvPr>
         </p:nvSpPr>
-        <p:spPr/>
+        <p:spPr>
+          <a:xfrm>
+            <a:off x="612648" y="1680898"/>
+            <a:ext cx="10515600" cy="4496065"/>
+          </a:xfrm>
+        </p:spPr>
         <p:txBody>
           <a:bodyPr vert="eaVert"/>
           <a:lstStyle/>
@@ -462,7 +494,7 @@
           <p:cNvPr id="4" name="Date Placeholder 3">
             <a:extLst>
               <a:ext uri="{FF2B5EF4-FFF2-40B4-BE49-F238E27FC236}">
-                <a16:creationId xmlns:a16="http://schemas.microsoft.com/office/drawing/2014/main" id="{C8A70B00-53AE-4D3F-91BE-A8D789ED9864}"/>
+                <a16:creationId xmlns:a16="http://schemas.microsoft.com/office/drawing/2014/main" id="{EEDC9908-8F95-8DFC-72CC-158552B56735}"/>
               </a:ext>
             </a:extLst>
           </p:cNvPr>
@@ -478,7 +510,7 @@
           <a:bodyPr/>
           <a:lstStyle/>
           <a:p>
-            <a:fld id="{F18115DA-6CBC-4AEF-A85F-371C66916CF8}" type="datetimeFigureOut">
+            <a:fld id="{F7E76D0F-5A12-4D0A-80B0-1A6122B61E7B}" type="datetimeFigureOut">
               <a:rPr lang="en-US" dirty="0"/>
               <a:t>1/11/2025</a:t>
             </a:fld>
@@ -491,7 +523,7 @@
           <p:cNvPr id="5" name="Footer Placeholder 4">
             <a:extLst>
               <a:ext uri="{FF2B5EF4-FFF2-40B4-BE49-F238E27FC236}">
-                <a16:creationId xmlns:a16="http://schemas.microsoft.com/office/drawing/2014/main" id="{06647FC7-8124-4F70-A849-B6BCC5189CC3}"/>
+                <a16:creationId xmlns:a16="http://schemas.microsoft.com/office/drawing/2014/main" id="{2C26C9BE-9060-50CB-2BB7-07307FF89A7A}"/>
               </a:ext>
             </a:extLst>
           </p:cNvPr>
@@ -520,7 +552,7 @@
           <p:cNvPr id="6" name="Slide Number Placeholder 5">
             <a:extLst>
               <a:ext uri="{FF2B5EF4-FFF2-40B4-BE49-F238E27FC236}">
-                <a16:creationId xmlns:a16="http://schemas.microsoft.com/office/drawing/2014/main" id="{B47CEBE4-50DC-47DB-B699-CCC024336C9F}"/>
+                <a16:creationId xmlns:a16="http://schemas.microsoft.com/office/drawing/2014/main" id="{A84A835B-97D3-BC22-F0B8-4986D4636271}"/>
               </a:ext>
             </a:extLst>
           </p:cNvPr>
@@ -536,7 +568,7 @@
           <a:bodyPr/>
           <a:lstStyle/>
           <a:p>
-            <a:fld id="{E30AF5A0-43BB-4336-8627-9123B9144D80}" type="slidenum">
+            <a:fld id="{CC057153-B650-4DEB-B370-79DDCFDCE934}" type="slidenum">
               <a:rPr lang="en-US" dirty="0"/>
               <a:t>‹#›</a:t>
             </a:fld>
@@ -547,18 +579,13 @@
     </p:spTree>
     <p:extLst>
       <p:ext uri="{BB962C8B-B14F-4D97-AF65-F5344CB8AC3E}">
-        <p14:creationId xmlns:p14="http://schemas.microsoft.com/office/powerpoint/2010/main" val="1554896161"/>
+        <p14:creationId xmlns:p14="http://schemas.microsoft.com/office/powerpoint/2010/main" val="799323174"/>
       </p:ext>
     </p:extLst>
   </p:cSld>
   <p:clrMapOvr>
     <a:masterClrMapping/>
   </p:clrMapOvr>
-  <p:extLst>
-    <p:ext uri="{DCECCB84-F9BA-43D5-87BE-67443E8EF086}">
-      <p15:sldGuideLst xmlns:p15="http://schemas.microsoft.com/office/powerpoint/2012/main"/>
-    </p:ext>
-  </p:extLst>
 </p:sldLayout>
 </file>
 
@@ -584,7 +611,7 @@
           <p:cNvPr id="2" name="Vertical Title 1">
             <a:extLst>
               <a:ext uri="{FF2B5EF4-FFF2-40B4-BE49-F238E27FC236}">
-                <a16:creationId xmlns:a16="http://schemas.microsoft.com/office/drawing/2014/main" id="{4B418279-D3B8-4C6A-AB74-9DE377771270}"/>
+                <a16:creationId xmlns:a16="http://schemas.microsoft.com/office/drawing/2014/main" id="{485B0252-346C-F6F4-3642-19F571550D45}"/>
               </a:ext>
             </a:extLst>
           </p:cNvPr>
@@ -597,8 +624,8 @@
         </p:nvSpPr>
         <p:spPr>
           <a:xfrm>
-            <a:off x="9242322" y="997974"/>
-            <a:ext cx="2349043" cy="4984956"/>
+            <a:off x="9634888" y="578497"/>
+            <a:ext cx="2047037" cy="5598466"/>
           </a:xfrm>
         </p:spPr>
         <p:txBody>
@@ -617,7 +644,7 @@
           <p:cNvPr id="3" name="Vertical Text Placeholder 2">
             <a:extLst>
               <a:ext uri="{FF2B5EF4-FFF2-40B4-BE49-F238E27FC236}">
-                <a16:creationId xmlns:a16="http://schemas.microsoft.com/office/drawing/2014/main" id="{E28F733C-9309-4197-BACA-207CDC8935C9}"/>
+                <a16:creationId xmlns:a16="http://schemas.microsoft.com/office/drawing/2014/main" id="{F798DA36-7351-9D6A-518B-678AB8A507D3}"/>
               </a:ext>
             </a:extLst>
           </p:cNvPr>
@@ -630,8 +657,8 @@
         </p:nvSpPr>
         <p:spPr>
           <a:xfrm>
-            <a:off x="838200" y="997973"/>
-            <a:ext cx="8404122" cy="4984956"/>
+            <a:off x="838200" y="578497"/>
+            <a:ext cx="8796688" cy="5598465"/>
           </a:xfrm>
         </p:spPr>
         <p:txBody>
@@ -679,7 +706,7 @@
           <p:cNvPr id="4" name="Date Placeholder 3">
             <a:extLst>
               <a:ext uri="{FF2B5EF4-FFF2-40B4-BE49-F238E27FC236}">
-                <a16:creationId xmlns:a16="http://schemas.microsoft.com/office/drawing/2014/main" id="{56ACD4D0-5BE6-412D-B08B-5DFFD593513E}"/>
+                <a16:creationId xmlns:a16="http://schemas.microsoft.com/office/drawing/2014/main" id="{8846BDFF-D746-836C-04B8-CA89AD5D1466}"/>
               </a:ext>
             </a:extLst>
           </p:cNvPr>
@@ -695,7 +722,7 @@
           <a:bodyPr/>
           <a:lstStyle/>
           <a:p>
-            <a:fld id="{2A6007E4-95E8-4ABC-B20B-51235318A487}" type="datetimeFigureOut">
+            <a:fld id="{8B9E8C84-89CA-44AB-B0BE-5C91BAF75478}" type="datetimeFigureOut">
               <a:rPr lang="en-US" dirty="0"/>
               <a:t>1/11/2025</a:t>
             </a:fld>
@@ -708,7 +735,7 @@
           <p:cNvPr id="5" name="Footer Placeholder 4">
             <a:extLst>
               <a:ext uri="{FF2B5EF4-FFF2-40B4-BE49-F238E27FC236}">
-                <a16:creationId xmlns:a16="http://schemas.microsoft.com/office/drawing/2014/main" id="{55021651-B786-4A39-A10F-F5231D0A2C5E}"/>
+                <a16:creationId xmlns:a16="http://schemas.microsoft.com/office/drawing/2014/main" id="{919AA929-A9E6-FF9C-0C59-177F892D6A69}"/>
               </a:ext>
             </a:extLst>
           </p:cNvPr>
@@ -737,7 +764,7 @@
           <p:cNvPr id="6" name="Slide Number Placeholder 5">
             <a:extLst>
               <a:ext uri="{FF2B5EF4-FFF2-40B4-BE49-F238E27FC236}">
-                <a16:creationId xmlns:a16="http://schemas.microsoft.com/office/drawing/2014/main" id="{74504D2D-9379-40DE-9F45-3004BE54F16B}"/>
+                <a16:creationId xmlns:a16="http://schemas.microsoft.com/office/drawing/2014/main" id="{9316D893-7E81-90DC-4139-7687B39C3AC8}"/>
               </a:ext>
             </a:extLst>
           </p:cNvPr>
@@ -753,7 +780,7 @@
           <a:bodyPr/>
           <a:lstStyle/>
           <a:p>
-            <a:fld id="{E30AF5A0-43BB-4336-8627-9123B9144D80}" type="slidenum">
+            <a:fld id="{CC057153-B650-4DEB-B370-79DDCFDCE934}" type="slidenum">
               <a:rPr lang="en-US" dirty="0"/>
               <a:t>‹#›</a:t>
             </a:fld>
@@ -764,18 +791,13 @@
     </p:spTree>
     <p:extLst>
       <p:ext uri="{BB962C8B-B14F-4D97-AF65-F5344CB8AC3E}">
-        <p14:creationId xmlns:p14="http://schemas.microsoft.com/office/powerpoint/2010/main" val="49899664"/>
+        <p14:creationId xmlns:p14="http://schemas.microsoft.com/office/powerpoint/2010/main" val="804507278"/>
       </p:ext>
     </p:extLst>
   </p:cSld>
   <p:clrMapOvr>
     <a:masterClrMapping/>
   </p:clrMapOvr>
-  <p:extLst>
-    <p:ext uri="{DCECCB84-F9BA-43D5-87BE-67443E8EF086}">
-      <p15:sldGuideLst xmlns:p15="http://schemas.microsoft.com/office/powerpoint/2012/main"/>
-    </p:ext>
-  </p:extLst>
 </p:sldLayout>
 </file>
 
@@ -801,7 +823,7 @@
           <p:cNvPr id="2" name="Title 1">
             <a:extLst>
               <a:ext uri="{FF2B5EF4-FFF2-40B4-BE49-F238E27FC236}">
-                <a16:creationId xmlns:a16="http://schemas.microsoft.com/office/drawing/2014/main" id="{5A987CA6-BFD9-4CB1-8892-F6B062E82445}"/>
+                <a16:creationId xmlns:a16="http://schemas.microsoft.com/office/drawing/2014/main" id="{BC7433D9-FD02-59E2-0F81-A0B7201D2DA0}"/>
               </a:ext>
             </a:extLst>
           </p:cNvPr>
@@ -829,7 +851,7 @@
           <p:cNvPr id="3" name="Content Placeholder 2">
             <a:extLst>
               <a:ext uri="{FF2B5EF4-FFF2-40B4-BE49-F238E27FC236}">
-                <a16:creationId xmlns:a16="http://schemas.microsoft.com/office/drawing/2014/main" id="{E0CDA8C3-9C0C-4E52-9A62-E4DB159E6B0E}"/>
+                <a16:creationId xmlns:a16="http://schemas.microsoft.com/office/drawing/2014/main" id="{6C2DD052-3E45-E789-01F8-33250024ECBD}"/>
               </a:ext>
             </a:extLst>
           </p:cNvPr>
@@ -886,7 +908,7 @@
           <p:cNvPr id="4" name="Date Placeholder 3">
             <a:extLst>
               <a:ext uri="{FF2B5EF4-FFF2-40B4-BE49-F238E27FC236}">
-                <a16:creationId xmlns:a16="http://schemas.microsoft.com/office/drawing/2014/main" id="{7CC3EC35-E02F-41FF-9232-F90692A902FC}"/>
+                <a16:creationId xmlns:a16="http://schemas.microsoft.com/office/drawing/2014/main" id="{0B9485D1-E172-8F0A-A425-3097B3ABCFB4}"/>
               </a:ext>
             </a:extLst>
           </p:cNvPr>
@@ -902,7 +924,7 @@
           <a:bodyPr/>
           <a:lstStyle/>
           <a:p>
-            <a:fld id="{2A4BF121-2723-4D35-ADA9-215CD054C4BC}" type="datetimeFigureOut">
+            <a:fld id="{73E7156E-175E-4DBA-9D21-B772C320F342}" type="datetimeFigureOut">
               <a:rPr lang="en-US" dirty="0"/>
               <a:t>1/11/2025</a:t>
             </a:fld>
@@ -915,7 +937,7 @@
           <p:cNvPr id="5" name="Footer Placeholder 4">
             <a:extLst>
               <a:ext uri="{FF2B5EF4-FFF2-40B4-BE49-F238E27FC236}">
-                <a16:creationId xmlns:a16="http://schemas.microsoft.com/office/drawing/2014/main" id="{39D13D38-5DF1-443B-8A12-71E834FDC6A1}"/>
+                <a16:creationId xmlns:a16="http://schemas.microsoft.com/office/drawing/2014/main" id="{B17E6B5E-6174-FD5C-41E8-FFC44C650D7E}"/>
               </a:ext>
             </a:extLst>
           </p:cNvPr>
@@ -944,7 +966,7 @@
           <p:cNvPr id="6" name="Slide Number Placeholder 5">
             <a:extLst>
               <a:ext uri="{FF2B5EF4-FFF2-40B4-BE49-F238E27FC236}">
-                <a16:creationId xmlns:a16="http://schemas.microsoft.com/office/drawing/2014/main" id="{F25E644A-4A37-4757-9809-5B035E2874E6}"/>
+                <a16:creationId xmlns:a16="http://schemas.microsoft.com/office/drawing/2014/main" id="{4BF72154-F85B-E301-DA57-E314D7315916}"/>
               </a:ext>
             </a:extLst>
           </p:cNvPr>
@@ -960,7 +982,7 @@
           <a:bodyPr/>
           <a:lstStyle/>
           <a:p>
-            <a:fld id="{E30AF5A0-43BB-4336-8627-9123B9144D80}" type="slidenum">
+            <a:fld id="{CC057153-B650-4DEB-B370-79DDCFDCE934}" type="slidenum">
               <a:rPr lang="en-US" dirty="0"/>
               <a:t>‹#›</a:t>
             </a:fld>
@@ -971,18 +993,13 @@
     </p:spTree>
     <p:extLst>
       <p:ext uri="{BB962C8B-B14F-4D97-AF65-F5344CB8AC3E}">
-        <p14:creationId xmlns:p14="http://schemas.microsoft.com/office/powerpoint/2010/main" val="166398949"/>
+        <p14:creationId xmlns:p14="http://schemas.microsoft.com/office/powerpoint/2010/main" val="2202459210"/>
       </p:ext>
     </p:extLst>
   </p:cSld>
   <p:clrMapOvr>
     <a:masterClrMapping/>
   </p:clrMapOvr>
-  <p:extLst>
-    <p:ext uri="{DCECCB84-F9BA-43D5-87BE-67443E8EF086}">
-      <p15:sldGuideLst xmlns:p15="http://schemas.microsoft.com/office/powerpoint/2012/main"/>
-    </p:ext>
-  </p:extLst>
 </p:sldLayout>
 </file>
 
@@ -1008,7 +1025,7 @@
           <p:cNvPr id="2" name="Title 1">
             <a:extLst>
               <a:ext uri="{FF2B5EF4-FFF2-40B4-BE49-F238E27FC236}">
-                <a16:creationId xmlns:a16="http://schemas.microsoft.com/office/drawing/2014/main" id="{70E6578B-CD85-4BF1-A729-E8E8079B595F}"/>
+                <a16:creationId xmlns:a16="http://schemas.microsoft.com/office/drawing/2014/main" id="{951D06AF-EF87-8489-2C82-DEB90B7EFE0C}"/>
               </a:ext>
             </a:extLst>
           </p:cNvPr>
@@ -1021,15 +1038,17 @@
         </p:nvSpPr>
         <p:spPr>
           <a:xfrm>
-            <a:off x="715383" y="1709738"/>
-            <a:ext cx="10632067" cy="2852737"/>
+            <a:off x="603381" y="553616"/>
+            <a:ext cx="8273140" cy="4008859"/>
           </a:xfrm>
         </p:spPr>
         <p:txBody>
-          <a:bodyPr anchor="b"/>
+          <a:bodyPr anchor="t">
+            <a:normAutofit/>
+          </a:bodyPr>
           <a:lstStyle>
             <a:lvl1pPr>
-              <a:defRPr sz="6000"/>
+              <a:defRPr sz="5400" cap="all" baseline="0"/>
             </a:lvl1pPr>
           </a:lstStyle>
           <a:p>
@@ -1045,7 +1064,7 @@
           <p:cNvPr id="3" name="Text Placeholder 2">
             <a:extLst>
               <a:ext uri="{FF2B5EF4-FFF2-40B4-BE49-F238E27FC236}">
-                <a16:creationId xmlns:a16="http://schemas.microsoft.com/office/drawing/2014/main" id="{A58448C1-C13F-4826-8347-EEB00A6643D6}"/>
+                <a16:creationId xmlns:a16="http://schemas.microsoft.com/office/drawing/2014/main" id="{308E5678-CA38-1318-9EA2-5E0A4F9A59BA}"/>
               </a:ext>
             </a:extLst>
           </p:cNvPr>
@@ -1058,20 +1077,20 @@
         </p:nvSpPr>
         <p:spPr>
           <a:xfrm>
-            <a:off x="715383" y="4589463"/>
-            <a:ext cx="10632067" cy="1500187"/>
+            <a:off x="603380" y="4589463"/>
+            <a:ext cx="8273140" cy="1384617"/>
           </a:xfrm>
         </p:spPr>
         <p:txBody>
-          <a:bodyPr/>
+          <a:bodyPr anchor="b">
+            <a:normAutofit/>
+          </a:bodyPr>
           <a:lstStyle>
             <a:lvl1pPr marL="0" indent="0">
               <a:buNone/>
-              <a:defRPr sz="2400">
+              <a:defRPr sz="2000">
                 <a:solidFill>
-                  <a:schemeClr val="tx1">
-                    <a:tint val="75000"/>
-                  </a:schemeClr>
+                  <a:schemeClr val="tx1"/>
                 </a:solidFill>
               </a:defRPr>
             </a:lvl1pPr>
@@ -1170,7 +1189,7 @@
           <p:cNvPr id="4" name="Date Placeholder 3">
             <a:extLst>
               <a:ext uri="{FF2B5EF4-FFF2-40B4-BE49-F238E27FC236}">
-                <a16:creationId xmlns:a16="http://schemas.microsoft.com/office/drawing/2014/main" id="{5806546A-957F-4C4D-9744-1177AD258E10}"/>
+                <a16:creationId xmlns:a16="http://schemas.microsoft.com/office/drawing/2014/main" id="{44E99186-7E5A-60AF-DE69-5C7DA71611AB}"/>
               </a:ext>
             </a:extLst>
           </p:cNvPr>
@@ -1186,7 +1205,7 @@
           <a:bodyPr/>
           <a:lstStyle/>
           <a:p>
-            <a:fld id="{C54F54BA-4BC6-480F-839C-951A49B248A9}" type="datetimeFigureOut">
+            <a:fld id="{04895F6E-3D02-4292-95D1-C62B3126321B}" type="datetimeFigureOut">
               <a:rPr lang="en-US" dirty="0"/>
               <a:t>1/11/2025</a:t>
             </a:fld>
@@ -1199,7 +1218,7 @@
           <p:cNvPr id="5" name="Footer Placeholder 4">
             <a:extLst>
               <a:ext uri="{FF2B5EF4-FFF2-40B4-BE49-F238E27FC236}">
-                <a16:creationId xmlns:a16="http://schemas.microsoft.com/office/drawing/2014/main" id="{B1DB149C-CC63-4E3A-A83D-EF637EB51979}"/>
+                <a16:creationId xmlns:a16="http://schemas.microsoft.com/office/drawing/2014/main" id="{82FA13D1-1FBA-E820-323B-77B41F1A665D}"/>
               </a:ext>
             </a:extLst>
           </p:cNvPr>
@@ -1228,7 +1247,7 @@
           <p:cNvPr id="6" name="Slide Number Placeholder 5">
             <a:extLst>
               <a:ext uri="{FF2B5EF4-FFF2-40B4-BE49-F238E27FC236}">
-                <a16:creationId xmlns:a16="http://schemas.microsoft.com/office/drawing/2014/main" id="{EDB94775-7982-41EC-B584-D51224D38F77}"/>
+                <a16:creationId xmlns:a16="http://schemas.microsoft.com/office/drawing/2014/main" id="{FB39BE85-85F6-4636-C651-D87CC969A49E}"/>
               </a:ext>
             </a:extLst>
           </p:cNvPr>
@@ -1244,7 +1263,7 @@
           <a:bodyPr/>
           <a:lstStyle/>
           <a:p>
-            <a:fld id="{E30AF5A0-43BB-4336-8627-9123B9144D80}" type="slidenum">
+            <a:fld id="{CC057153-B650-4DEB-B370-79DDCFDCE934}" type="slidenum">
               <a:rPr lang="en-US" dirty="0"/>
               <a:t>‹#›</a:t>
             </a:fld>
@@ -1255,18 +1274,13 @@
     </p:spTree>
     <p:extLst>
       <p:ext uri="{BB962C8B-B14F-4D97-AF65-F5344CB8AC3E}">
-        <p14:creationId xmlns:p14="http://schemas.microsoft.com/office/powerpoint/2010/main" val="1307712700"/>
+        <p14:creationId xmlns:p14="http://schemas.microsoft.com/office/powerpoint/2010/main" val="2794919676"/>
       </p:ext>
     </p:extLst>
   </p:cSld>
   <p:clrMapOvr>
     <a:masterClrMapping/>
   </p:clrMapOvr>
-  <p:extLst>
-    <p:ext uri="{DCECCB84-F9BA-43D5-87BE-67443E8EF086}">
-      <p15:sldGuideLst xmlns:p15="http://schemas.microsoft.com/office/powerpoint/2012/main"/>
-    </p:ext>
-  </p:extLst>
 </p:sldLayout>
 </file>
 
@@ -1292,7 +1306,7 @@
           <p:cNvPr id="2" name="Title 1">
             <a:extLst>
               <a:ext uri="{FF2B5EF4-FFF2-40B4-BE49-F238E27FC236}">
-                <a16:creationId xmlns:a16="http://schemas.microsoft.com/office/drawing/2014/main" id="{88CE4BD8-507D-48E4-A624-F16A741C3609}"/>
+                <a16:creationId xmlns:a16="http://schemas.microsoft.com/office/drawing/2014/main" id="{FAF3BB49-A328-F121-7F27-DEB7C3CC2B0F}"/>
               </a:ext>
             </a:extLst>
           </p:cNvPr>
@@ -1305,8 +1319,8 @@
         </p:nvSpPr>
         <p:spPr>
           <a:xfrm>
-            <a:off x="700635" y="922096"/>
-            <a:ext cx="10691265" cy="1127930"/>
+            <a:off x="612648" y="548640"/>
+            <a:ext cx="10741152" cy="1132258"/>
           </a:xfrm>
         </p:spPr>
         <p:txBody>
@@ -1325,7 +1339,7 @@
           <p:cNvPr id="3" name="Content Placeholder 2">
             <a:extLst>
               <a:ext uri="{FF2B5EF4-FFF2-40B4-BE49-F238E27FC236}">
-                <a16:creationId xmlns:a16="http://schemas.microsoft.com/office/drawing/2014/main" id="{810A07E4-3A39-457C-A059-7DFB6039D947}"/>
+                <a16:creationId xmlns:a16="http://schemas.microsoft.com/office/drawing/2014/main" id="{572E861E-DFBA-B4AA-9356-CDE3D3F57C04}"/>
               </a:ext>
             </a:extLst>
           </p:cNvPr>
@@ -1338,8 +1352,8 @@
         </p:nvSpPr>
         <p:spPr>
           <a:xfrm>
-            <a:off x="715383" y="2128684"/>
-            <a:ext cx="5304417" cy="3844414"/>
+            <a:off x="612648" y="1825625"/>
+            <a:ext cx="5181600" cy="4351338"/>
           </a:xfrm>
         </p:spPr>
         <p:txBody>
@@ -1387,7 +1401,7 @@
           <p:cNvPr id="4" name="Content Placeholder 3">
             <a:extLst>
               <a:ext uri="{FF2B5EF4-FFF2-40B4-BE49-F238E27FC236}">
-                <a16:creationId xmlns:a16="http://schemas.microsoft.com/office/drawing/2014/main" id="{7B141E17-47CE-4A78-B0FA-0E9786DA67C5}"/>
+                <a16:creationId xmlns:a16="http://schemas.microsoft.com/office/drawing/2014/main" id="{451D7538-EC5A-3EE7-176F-A58920C50797}"/>
               </a:ext>
             </a:extLst>
           </p:cNvPr>
@@ -1400,8 +1414,8 @@
         </p:nvSpPr>
         <p:spPr>
           <a:xfrm>
-            <a:off x="6172200" y="2128684"/>
-            <a:ext cx="5219700" cy="3844414"/>
+            <a:off x="6172200" y="1825625"/>
+            <a:ext cx="5181600" cy="4351338"/>
           </a:xfrm>
         </p:spPr>
         <p:txBody>
@@ -1449,7 +1463,7 @@
           <p:cNvPr id="5" name="Date Placeholder 4">
             <a:extLst>
               <a:ext uri="{FF2B5EF4-FFF2-40B4-BE49-F238E27FC236}">
-                <a16:creationId xmlns:a16="http://schemas.microsoft.com/office/drawing/2014/main" id="{89F02C13-D3ED-4044-9716-F29D79A184C9}"/>
+                <a16:creationId xmlns:a16="http://schemas.microsoft.com/office/drawing/2014/main" id="{897D0B7E-1A60-DA52-6965-92412B1C2F9F}"/>
               </a:ext>
             </a:extLst>
           </p:cNvPr>
@@ -1465,7 +1479,7 @@
           <a:bodyPr/>
           <a:lstStyle/>
           <a:p>
-            <a:fld id="{0F9DD0EA-4726-4440-BF9D-E88296FC3068}" type="datetimeFigureOut">
+            <a:fld id="{EDCB5ACB-D10C-44A8-9570-124370F4CB38}" type="datetimeFigureOut">
               <a:rPr lang="en-US" dirty="0"/>
               <a:t>1/11/2025</a:t>
             </a:fld>
@@ -1478,7 +1492,7 @@
           <p:cNvPr id="6" name="Footer Placeholder 5">
             <a:extLst>
               <a:ext uri="{FF2B5EF4-FFF2-40B4-BE49-F238E27FC236}">
-                <a16:creationId xmlns:a16="http://schemas.microsoft.com/office/drawing/2014/main" id="{8AF334AD-FB29-4355-B5CF-85E61B4F3409}"/>
+                <a16:creationId xmlns:a16="http://schemas.microsoft.com/office/drawing/2014/main" id="{C2BDD5A2-CE3E-3215-6DAA-F75C0D1229DA}"/>
               </a:ext>
             </a:extLst>
           </p:cNvPr>
@@ -1507,7 +1521,7 @@
           <p:cNvPr id="7" name="Slide Number Placeholder 6">
             <a:extLst>
               <a:ext uri="{FF2B5EF4-FFF2-40B4-BE49-F238E27FC236}">
-                <a16:creationId xmlns:a16="http://schemas.microsoft.com/office/drawing/2014/main" id="{BA5AA154-790C-4774-9C21-8C543E733F26}"/>
+                <a16:creationId xmlns:a16="http://schemas.microsoft.com/office/drawing/2014/main" id="{B1B822F1-284A-1786-FAF2-72129E2FE64D}"/>
               </a:ext>
             </a:extLst>
           </p:cNvPr>
@@ -1523,7 +1537,7 @@
           <a:bodyPr/>
           <a:lstStyle/>
           <a:p>
-            <a:fld id="{E30AF5A0-43BB-4336-8627-9123B9144D80}" type="slidenum">
+            <a:fld id="{CC057153-B650-4DEB-B370-79DDCFDCE934}" type="slidenum">
               <a:rPr lang="en-US" dirty="0"/>
               <a:t>‹#›</a:t>
             </a:fld>
@@ -1534,18 +1548,13 @@
     </p:spTree>
     <p:extLst>
       <p:ext uri="{BB962C8B-B14F-4D97-AF65-F5344CB8AC3E}">
-        <p14:creationId xmlns:p14="http://schemas.microsoft.com/office/powerpoint/2010/main" val="3883350463"/>
+        <p14:creationId xmlns:p14="http://schemas.microsoft.com/office/powerpoint/2010/main" val="1723420082"/>
       </p:ext>
     </p:extLst>
   </p:cSld>
   <p:clrMapOvr>
     <a:masterClrMapping/>
   </p:clrMapOvr>
-  <p:extLst>
-    <p:ext uri="{DCECCB84-F9BA-43D5-87BE-67443E8EF086}">
-      <p15:sldGuideLst xmlns:p15="http://schemas.microsoft.com/office/powerpoint/2012/main"/>
-    </p:ext>
-  </p:extLst>
 </p:sldLayout>
 </file>
 
@@ -1571,7 +1580,7 @@
           <p:cNvPr id="2" name="Title 1">
             <a:extLst>
               <a:ext uri="{FF2B5EF4-FFF2-40B4-BE49-F238E27FC236}">
-                <a16:creationId xmlns:a16="http://schemas.microsoft.com/office/drawing/2014/main" id="{9E07DD35-7673-4F88-86B0-634883B5E345}"/>
+                <a16:creationId xmlns:a16="http://schemas.microsoft.com/office/drawing/2014/main" id="{41FEE969-634D-6E32-D227-18E9282C6F9E}"/>
               </a:ext>
             </a:extLst>
           </p:cNvPr>
@@ -1584,8 +1593,8 @@
         </p:nvSpPr>
         <p:spPr>
           <a:xfrm>
-            <a:off x="685887" y="929148"/>
-            <a:ext cx="10640005" cy="761540"/>
+            <a:off x="609600" y="547396"/>
+            <a:ext cx="10745788" cy="1143292"/>
           </a:xfrm>
         </p:spPr>
         <p:txBody>
@@ -1604,7 +1613,7 @@
           <p:cNvPr id="3" name="Text Placeholder 2">
             <a:extLst>
               <a:ext uri="{FF2B5EF4-FFF2-40B4-BE49-F238E27FC236}">
-                <a16:creationId xmlns:a16="http://schemas.microsoft.com/office/drawing/2014/main" id="{5EC820D7-3E0B-47C6-A583-C4C839C5AF03}"/>
+                <a16:creationId xmlns:a16="http://schemas.microsoft.com/office/drawing/2014/main" id="{61CD26D4-290A-F0ED-7D62-41EDA6FEC2B9}"/>
               </a:ext>
             </a:extLst>
           </p:cNvPr>
@@ -1617,8 +1626,8 @@
         </p:nvSpPr>
         <p:spPr>
           <a:xfrm>
-            <a:off x="715384" y="1681163"/>
-            <a:ext cx="5282192" cy="657225"/>
+            <a:off x="609600" y="1685735"/>
+            <a:ext cx="5157787" cy="559834"/>
           </a:xfrm>
         </p:spPr>
         <p:txBody>
@@ -1627,18 +1636,19 @@
           </a:bodyPr>
           <a:lstStyle>
             <a:lvl1pPr marL="0" indent="0">
-              <a:buNone/>
-              <a:defRPr sz="1600" b="1">
-                <a:latin typeface="+mj-lt"/>
-              </a:defRPr>
+              <a:lnSpc>
+                <a:spcPct val="90000"/>
+              </a:lnSpc>
+              <a:buNone/>
+              <a:defRPr sz="2000" b="1" cap="all" baseline="0"/>
             </a:lvl1pPr>
             <a:lvl2pPr marL="457200" indent="0">
               <a:buNone/>
-              <a:defRPr sz="1600" b="1"/>
+              <a:defRPr sz="2000" b="1"/>
             </a:lvl2pPr>
             <a:lvl3pPr marL="914400" indent="0">
               <a:buNone/>
-              <a:defRPr sz="1600" b="1"/>
+              <a:defRPr sz="1800" b="1"/>
             </a:lvl3pPr>
             <a:lvl4pPr marL="1371600" indent="0">
               <a:buNone/>
@@ -1679,7 +1689,7 @@
           <p:cNvPr id="4" name="Content Placeholder 3">
             <a:extLst>
               <a:ext uri="{FF2B5EF4-FFF2-40B4-BE49-F238E27FC236}">
-                <a16:creationId xmlns:a16="http://schemas.microsoft.com/office/drawing/2014/main" id="{6A839A7B-97D5-400F-B802-A0FF28FE9F15}"/>
+                <a16:creationId xmlns:a16="http://schemas.microsoft.com/office/drawing/2014/main" id="{94DA52B0-7419-A946-4523-6D34BCAD26D1}"/>
               </a:ext>
             </a:extLst>
           </p:cNvPr>
@@ -1692,8 +1702,8 @@
         </p:nvSpPr>
         <p:spPr>
           <a:xfrm>
-            <a:off x="715384" y="2505075"/>
-            <a:ext cx="5282192" cy="3423777"/>
+            <a:off x="609600" y="2386894"/>
+            <a:ext cx="5157787" cy="3765089"/>
           </a:xfrm>
         </p:spPr>
         <p:txBody>
@@ -1741,7 +1751,7 @@
           <p:cNvPr id="5" name="Text Placeholder 4">
             <a:extLst>
               <a:ext uri="{FF2B5EF4-FFF2-40B4-BE49-F238E27FC236}">
-                <a16:creationId xmlns:a16="http://schemas.microsoft.com/office/drawing/2014/main" id="{C2E0ECA2-DBF1-4681-9DFA-93AFD1B371DB}"/>
+                <a16:creationId xmlns:a16="http://schemas.microsoft.com/office/drawing/2014/main" id="{06536620-C4F3-EEC3-DBF1-05196B1CBB55}"/>
               </a:ext>
             </a:extLst>
           </p:cNvPr>
@@ -1754,8 +1764,8 @@
         </p:nvSpPr>
         <p:spPr>
           <a:xfrm>
-            <a:off x="6172200" y="1681163"/>
-            <a:ext cx="5183188" cy="657225"/>
+            <a:off x="6172200" y="1685735"/>
+            <a:ext cx="5183188" cy="559834"/>
           </a:xfrm>
         </p:spPr>
         <p:txBody>
@@ -1764,18 +1774,19 @@
           </a:bodyPr>
           <a:lstStyle>
             <a:lvl1pPr marL="0" indent="0">
-              <a:buNone/>
-              <a:defRPr sz="1600" b="1">
-                <a:latin typeface="+mj-lt"/>
-              </a:defRPr>
+              <a:lnSpc>
+                <a:spcPct val="90000"/>
+              </a:lnSpc>
+              <a:buNone/>
+              <a:defRPr sz="2000" b="1" cap="all" baseline="0"/>
             </a:lvl1pPr>
             <a:lvl2pPr marL="457200" indent="0">
               <a:buNone/>
-              <a:defRPr sz="1600" b="1"/>
+              <a:defRPr sz="2000" b="1"/>
             </a:lvl2pPr>
             <a:lvl3pPr marL="914400" indent="0">
               <a:buNone/>
-              <a:defRPr sz="1600" b="1"/>
+              <a:defRPr sz="1800" b="1"/>
             </a:lvl3pPr>
             <a:lvl4pPr marL="1371600" indent="0">
               <a:buNone/>
@@ -1816,7 +1827,7 @@
           <p:cNvPr id="6" name="Content Placeholder 5">
             <a:extLst>
               <a:ext uri="{FF2B5EF4-FFF2-40B4-BE49-F238E27FC236}">
-                <a16:creationId xmlns:a16="http://schemas.microsoft.com/office/drawing/2014/main" id="{390EBBBB-517F-4ED7-9E51-CF0F7590B4D4}"/>
+                <a16:creationId xmlns:a16="http://schemas.microsoft.com/office/drawing/2014/main" id="{33BAE980-E611-98B5-04E9-DE4584B0E33F}"/>
               </a:ext>
             </a:extLst>
           </p:cNvPr>
@@ -1829,8 +1840,8 @@
         </p:nvSpPr>
         <p:spPr>
           <a:xfrm>
-            <a:off x="6172200" y="2505075"/>
-            <a:ext cx="5183188" cy="3423777"/>
+            <a:off x="6172199" y="2386894"/>
+            <a:ext cx="5183189" cy="3765089"/>
           </a:xfrm>
         </p:spPr>
         <p:txBody>
@@ -1878,7 +1889,7 @@
           <p:cNvPr id="7" name="Date Placeholder 6">
             <a:extLst>
               <a:ext uri="{FF2B5EF4-FFF2-40B4-BE49-F238E27FC236}">
-                <a16:creationId xmlns:a16="http://schemas.microsoft.com/office/drawing/2014/main" id="{2511B5C7-1E37-478F-B4B0-C7202FFE41B9}"/>
+                <a16:creationId xmlns:a16="http://schemas.microsoft.com/office/drawing/2014/main" id="{4E3B3581-658A-8487-F9CB-E79F2BFF27E4}"/>
               </a:ext>
             </a:extLst>
           </p:cNvPr>
@@ -1894,7 +1905,7 @@
           <a:bodyPr/>
           <a:lstStyle/>
           <a:p>
-            <a:fld id="{19CAD10D-99D1-46B2-A85A-C16850FCF8CF}" type="datetimeFigureOut">
+            <a:fld id="{AB8D84F4-0E7A-4BDE-98C6-AE68FB974645}" type="datetimeFigureOut">
               <a:rPr lang="en-US" dirty="0"/>
               <a:t>1/11/2025</a:t>
             </a:fld>
@@ -1907,7 +1918,7 @@
           <p:cNvPr id="8" name="Footer Placeholder 7">
             <a:extLst>
               <a:ext uri="{FF2B5EF4-FFF2-40B4-BE49-F238E27FC236}">
-                <a16:creationId xmlns:a16="http://schemas.microsoft.com/office/drawing/2014/main" id="{9153F7EF-507C-4CB3-86C5-8B34FFFC1D86}"/>
+                <a16:creationId xmlns:a16="http://schemas.microsoft.com/office/drawing/2014/main" id="{949D76D8-9033-26CF-BF4C-AECCC685C177}"/>
               </a:ext>
             </a:extLst>
           </p:cNvPr>
@@ -1936,7 +1947,7 @@
           <p:cNvPr id="9" name="Slide Number Placeholder 8">
             <a:extLst>
               <a:ext uri="{FF2B5EF4-FFF2-40B4-BE49-F238E27FC236}">
-                <a16:creationId xmlns:a16="http://schemas.microsoft.com/office/drawing/2014/main" id="{58E3DEA6-E4EB-4C2A-8B4F-55EC965B6219}"/>
+                <a16:creationId xmlns:a16="http://schemas.microsoft.com/office/drawing/2014/main" id="{E02A06B8-CC1D-542F-D8EB-7625046B91D2}"/>
               </a:ext>
             </a:extLst>
           </p:cNvPr>
@@ -1952,7 +1963,7 @@
           <a:bodyPr/>
           <a:lstStyle/>
           <a:p>
-            <a:fld id="{E30AF5A0-43BB-4336-8627-9123B9144D80}" type="slidenum">
+            <a:fld id="{CC057153-B650-4DEB-B370-79DDCFDCE934}" type="slidenum">
               <a:rPr lang="en-US" dirty="0"/>
               <a:t>‹#›</a:t>
             </a:fld>
@@ -1963,7 +1974,7 @@
     </p:spTree>
     <p:extLst>
       <p:ext uri="{BB962C8B-B14F-4D97-AF65-F5344CB8AC3E}">
-        <p14:creationId xmlns:p14="http://schemas.microsoft.com/office/powerpoint/2010/main" val="1725944978"/>
+        <p14:creationId xmlns:p14="http://schemas.microsoft.com/office/powerpoint/2010/main" val="2737475070"/>
       </p:ext>
     </p:extLst>
   </p:cSld>
@@ -1995,7 +2006,7 @@
           <p:cNvPr id="2" name="Title 1">
             <a:extLst>
               <a:ext uri="{FF2B5EF4-FFF2-40B4-BE49-F238E27FC236}">
-                <a16:creationId xmlns:a16="http://schemas.microsoft.com/office/drawing/2014/main" id="{38032964-A933-4B98-A141-A4B316DAFA9F}"/>
+                <a16:creationId xmlns:a16="http://schemas.microsoft.com/office/drawing/2014/main" id="{666A9F42-7FF7-F803-C075-BC4968D35E34}"/>
               </a:ext>
             </a:extLst>
           </p:cNvPr>
@@ -2023,7 +2034,7 @@
           <p:cNvPr id="3" name="Date Placeholder 2">
             <a:extLst>
               <a:ext uri="{FF2B5EF4-FFF2-40B4-BE49-F238E27FC236}">
-                <a16:creationId xmlns:a16="http://schemas.microsoft.com/office/drawing/2014/main" id="{5D684C9D-23DA-42B0-9DD3-7592F72E8DC9}"/>
+                <a16:creationId xmlns:a16="http://schemas.microsoft.com/office/drawing/2014/main" id="{E89E8268-7232-2944-F1BD-399F9419B563}"/>
               </a:ext>
             </a:extLst>
           </p:cNvPr>
@@ -2039,7 +2050,7 @@
           <a:bodyPr/>
           <a:lstStyle/>
           <a:p>
-            <a:fld id="{48C67E51-34D6-4E3D-8F41-CC63EA446EDD}" type="datetimeFigureOut">
+            <a:fld id="{CBEFF1D8-9801-4C4B-92F3-66C9A863BD74}" type="datetimeFigureOut">
               <a:rPr lang="en-US" dirty="0"/>
               <a:t>1/11/2025</a:t>
             </a:fld>
@@ -2052,7 +2063,7 @@
           <p:cNvPr id="4" name="Footer Placeholder 3">
             <a:extLst>
               <a:ext uri="{FF2B5EF4-FFF2-40B4-BE49-F238E27FC236}">
-                <a16:creationId xmlns:a16="http://schemas.microsoft.com/office/drawing/2014/main" id="{68BF8F05-876F-49D8-AE30-5BB2A91ECD59}"/>
+                <a16:creationId xmlns:a16="http://schemas.microsoft.com/office/drawing/2014/main" id="{6B968DDD-323F-89A1-84E3-DDBA626D9386}"/>
               </a:ext>
             </a:extLst>
           </p:cNvPr>
@@ -2081,7 +2092,7 @@
           <p:cNvPr id="5" name="Slide Number Placeholder 4">
             <a:extLst>
               <a:ext uri="{FF2B5EF4-FFF2-40B4-BE49-F238E27FC236}">
-                <a16:creationId xmlns:a16="http://schemas.microsoft.com/office/drawing/2014/main" id="{153D20DA-9260-4577-BB51-789570A243AF}"/>
+                <a16:creationId xmlns:a16="http://schemas.microsoft.com/office/drawing/2014/main" id="{98FBDC76-671D-1671-DCE2-D5658BD40E29}"/>
               </a:ext>
             </a:extLst>
           </p:cNvPr>
@@ -2097,7 +2108,7 @@
           <a:bodyPr/>
           <a:lstStyle/>
           <a:p>
-            <a:fld id="{E30AF5A0-43BB-4336-8627-9123B9144D80}" type="slidenum">
+            <a:fld id="{CC057153-B650-4DEB-B370-79DDCFDCE934}" type="slidenum">
               <a:rPr lang="en-US" dirty="0"/>
               <a:t>‹#›</a:t>
             </a:fld>
@@ -2108,7 +2119,7 @@
     </p:spTree>
     <p:extLst>
       <p:ext uri="{BB962C8B-B14F-4D97-AF65-F5344CB8AC3E}">
-        <p14:creationId xmlns:p14="http://schemas.microsoft.com/office/powerpoint/2010/main" val="2702154557"/>
+        <p14:creationId xmlns:p14="http://schemas.microsoft.com/office/powerpoint/2010/main" val="3295223465"/>
       </p:ext>
     </p:extLst>
   </p:cSld>
@@ -2140,7 +2151,7 @@
           <p:cNvPr id="2" name="Date Placeholder 1">
             <a:extLst>
               <a:ext uri="{FF2B5EF4-FFF2-40B4-BE49-F238E27FC236}">
-                <a16:creationId xmlns:a16="http://schemas.microsoft.com/office/drawing/2014/main" id="{AD2C1F24-E0A1-45A7-8EF5-92CD9799341C}"/>
+                <a16:creationId xmlns:a16="http://schemas.microsoft.com/office/drawing/2014/main" id="{49BC4D82-0182-501C-9231-46767680476E}"/>
               </a:ext>
             </a:extLst>
           </p:cNvPr>
@@ -2156,7 +2167,7 @@
           <a:bodyPr/>
           <a:lstStyle/>
           <a:p>
-            <a:fld id="{8D49E550-CE3F-497F-B953-7DE0932F91C0}" type="datetimeFigureOut">
+            <a:fld id="{961FE8FD-B23E-4E1A-83EF-0847EBEA0105}" type="datetimeFigureOut">
               <a:rPr lang="en-US" dirty="0"/>
               <a:t>1/11/2025</a:t>
             </a:fld>
@@ -2169,7 +2180,7 @@
           <p:cNvPr id="3" name="Footer Placeholder 2">
             <a:extLst>
               <a:ext uri="{FF2B5EF4-FFF2-40B4-BE49-F238E27FC236}">
-                <a16:creationId xmlns:a16="http://schemas.microsoft.com/office/drawing/2014/main" id="{3E021C19-210E-46B0-9036-5D8AECC9260C}"/>
+                <a16:creationId xmlns:a16="http://schemas.microsoft.com/office/drawing/2014/main" id="{10EAA6C9-A7F3-19F1-D17C-A1D83FAF553F}"/>
               </a:ext>
             </a:extLst>
           </p:cNvPr>
@@ -2198,7 +2209,7 @@
           <p:cNvPr id="4" name="Slide Number Placeholder 3">
             <a:extLst>
               <a:ext uri="{FF2B5EF4-FFF2-40B4-BE49-F238E27FC236}">
-                <a16:creationId xmlns:a16="http://schemas.microsoft.com/office/drawing/2014/main" id="{1A880FEF-487E-44DF-8615-DF2210419602}"/>
+                <a16:creationId xmlns:a16="http://schemas.microsoft.com/office/drawing/2014/main" id="{34EBB816-1B94-116F-92D4-6043AE9E0C6B}"/>
               </a:ext>
             </a:extLst>
           </p:cNvPr>
@@ -2214,7 +2225,7 @@
           <a:bodyPr/>
           <a:lstStyle/>
           <a:p>
-            <a:fld id="{E30AF5A0-43BB-4336-8627-9123B9144D80}" type="slidenum">
+            <a:fld id="{CC057153-B650-4DEB-B370-79DDCFDCE934}" type="slidenum">
               <a:rPr lang="en-US" dirty="0"/>
               <a:t>‹#›</a:t>
             </a:fld>
@@ -2225,7 +2236,7 @@
     </p:spTree>
     <p:extLst>
       <p:ext uri="{BB962C8B-B14F-4D97-AF65-F5344CB8AC3E}">
-        <p14:creationId xmlns:p14="http://schemas.microsoft.com/office/powerpoint/2010/main" val="3502532098"/>
+        <p14:creationId xmlns:p14="http://schemas.microsoft.com/office/powerpoint/2010/main" val="557391274"/>
       </p:ext>
     </p:extLst>
   </p:cSld>
@@ -2257,7 +2268,7 @@
           <p:cNvPr id="2" name="Title 1">
             <a:extLst>
               <a:ext uri="{FF2B5EF4-FFF2-40B4-BE49-F238E27FC236}">
-                <a16:creationId xmlns:a16="http://schemas.microsoft.com/office/drawing/2014/main" id="{11A568EE-74C8-43A6-90BC-2DDD965CF64A}"/>
+                <a16:creationId xmlns:a16="http://schemas.microsoft.com/office/drawing/2014/main" id="{C350C37F-77BE-E128-4248-D001C39E79C6}"/>
               </a:ext>
             </a:extLst>
           </p:cNvPr>
@@ -2270,15 +2281,17 @@
         </p:nvSpPr>
         <p:spPr>
           <a:xfrm>
-            <a:off x="678426" y="781665"/>
-            <a:ext cx="4093599" cy="1223452"/>
+            <a:off x="597160" y="553616"/>
+            <a:ext cx="3595634" cy="1757505"/>
           </a:xfrm>
         </p:spPr>
         <p:txBody>
-          <a:bodyPr anchor="b"/>
+          <a:bodyPr anchor="t">
+            <a:normAutofit/>
+          </a:bodyPr>
           <a:lstStyle>
             <a:lvl1pPr>
-              <a:defRPr sz="3200"/>
+              <a:defRPr sz="2800"/>
             </a:lvl1pPr>
           </a:lstStyle>
           <a:p>
@@ -2294,7 +2307,7 @@
           <p:cNvPr id="3" name="Content Placeholder 2">
             <a:extLst>
               <a:ext uri="{FF2B5EF4-FFF2-40B4-BE49-F238E27FC236}">
-                <a16:creationId xmlns:a16="http://schemas.microsoft.com/office/drawing/2014/main" id="{971C35AC-CAE3-48CF-A3E4-A075C9FDD71B}"/>
+                <a16:creationId xmlns:a16="http://schemas.microsoft.com/office/drawing/2014/main" id="{2F3B20A8-A604-C977-02C0-083BA8663484}"/>
               </a:ext>
             </a:extLst>
           </p:cNvPr>
@@ -2307,39 +2320,41 @@
         </p:nvSpPr>
         <p:spPr>
           <a:xfrm>
-            <a:off x="5183188" y="987425"/>
-            <a:ext cx="6172200" cy="4873625"/>
+            <a:off x="5134708" y="553616"/>
+            <a:ext cx="6279741" cy="5486400"/>
           </a:xfrm>
         </p:spPr>
         <p:txBody>
-          <a:bodyPr/>
+          <a:bodyPr>
+            <a:normAutofit/>
+          </a:bodyPr>
           <a:lstStyle>
             <a:lvl1pPr>
-              <a:defRPr sz="3200"/>
+              <a:defRPr sz="2800"/>
             </a:lvl1pPr>
             <a:lvl2pPr>
-              <a:defRPr sz="2800"/>
+              <a:defRPr sz="2400"/>
             </a:lvl2pPr>
             <a:lvl3pPr>
-              <a:defRPr sz="2400"/>
+              <a:defRPr sz="2000"/>
             </a:lvl3pPr>
             <a:lvl4pPr>
-              <a:defRPr sz="2000"/>
+              <a:defRPr sz="1800"/>
             </a:lvl4pPr>
             <a:lvl5pPr>
-              <a:defRPr sz="2000"/>
+              <a:defRPr sz="1800"/>
             </a:lvl5pPr>
             <a:lvl6pPr>
-              <a:defRPr sz="2000"/>
+              <a:defRPr sz="1800"/>
             </a:lvl6pPr>
             <a:lvl7pPr>
-              <a:defRPr sz="2000"/>
+              <a:defRPr sz="1800"/>
             </a:lvl7pPr>
             <a:lvl8pPr>
-              <a:defRPr sz="2000"/>
+              <a:defRPr sz="1800"/>
             </a:lvl8pPr>
             <a:lvl9pPr>
-              <a:defRPr sz="2000"/>
+              <a:defRPr sz="1800"/>
             </a:lvl9pPr>
           </a:lstStyle>
           <a:p>
@@ -2384,7 +2399,7 @@
           <p:cNvPr id="4" name="Text Placeholder 3">
             <a:extLst>
               <a:ext uri="{FF2B5EF4-FFF2-40B4-BE49-F238E27FC236}">
-                <a16:creationId xmlns:a16="http://schemas.microsoft.com/office/drawing/2014/main" id="{2D9D03EA-5FAD-4609-A2B8-624E426847E3}"/>
+                <a16:creationId xmlns:a16="http://schemas.microsoft.com/office/drawing/2014/main" id="{EC0EEBFB-2026-6A35-33ED-F008376B67A0}"/>
               </a:ext>
             </a:extLst>
           </p:cNvPr>
@@ -2397,16 +2412,18 @@
         </p:nvSpPr>
         <p:spPr>
           <a:xfrm>
-            <a:off x="688258" y="2315497"/>
-            <a:ext cx="4093599" cy="3553491"/>
+            <a:off x="597160" y="2311121"/>
+            <a:ext cx="3595634" cy="3728895"/>
           </a:xfrm>
         </p:spPr>
         <p:txBody>
-          <a:bodyPr/>
+          <a:bodyPr anchor="t">
+            <a:normAutofit/>
+          </a:bodyPr>
           <a:lstStyle>
             <a:lvl1pPr marL="0" indent="0">
               <a:buNone/>
-              <a:defRPr sz="1600"/>
+              <a:defRPr sz="1800"/>
             </a:lvl1pPr>
             <a:lvl2pPr marL="457200" indent="0">
               <a:buNone/>
@@ -2455,7 +2472,7 @@
           <p:cNvPr id="5" name="Date Placeholder 4">
             <a:extLst>
               <a:ext uri="{FF2B5EF4-FFF2-40B4-BE49-F238E27FC236}">
-                <a16:creationId xmlns:a16="http://schemas.microsoft.com/office/drawing/2014/main" id="{0B58D2EA-2191-4216-B64D-067BDFE12375}"/>
+                <a16:creationId xmlns:a16="http://schemas.microsoft.com/office/drawing/2014/main" id="{93F05638-7A56-469A-825A-1DFA600254C8}"/>
               </a:ext>
             </a:extLst>
           </p:cNvPr>
@@ -2471,7 +2488,7 @@
           <a:bodyPr/>
           <a:lstStyle/>
           <a:p>
-            <a:fld id="{217A0BF4-BAA0-4539-95F2-9C4277F97478}" type="datetimeFigureOut">
+            <a:fld id="{8DDF891E-A7C2-465C-AD39-8EDCB0F58E3C}" type="datetimeFigureOut">
               <a:rPr lang="en-US" dirty="0"/>
               <a:t>1/11/2025</a:t>
             </a:fld>
@@ -2484,7 +2501,7 @@
           <p:cNvPr id="6" name="Footer Placeholder 5">
             <a:extLst>
               <a:ext uri="{FF2B5EF4-FFF2-40B4-BE49-F238E27FC236}">
-                <a16:creationId xmlns:a16="http://schemas.microsoft.com/office/drawing/2014/main" id="{78042128-DAB4-481C-BEE6-3523E8E88BAD}"/>
+                <a16:creationId xmlns:a16="http://schemas.microsoft.com/office/drawing/2014/main" id="{9C85A215-184B-2105-0279-ED02F6445831}"/>
               </a:ext>
             </a:extLst>
           </p:cNvPr>
@@ -2513,7 +2530,7 @@
           <p:cNvPr id="7" name="Slide Number Placeholder 6">
             <a:extLst>
               <a:ext uri="{FF2B5EF4-FFF2-40B4-BE49-F238E27FC236}">
-                <a16:creationId xmlns:a16="http://schemas.microsoft.com/office/drawing/2014/main" id="{AE50E382-C500-4A4C-A7C6-43860383AB91}"/>
+                <a16:creationId xmlns:a16="http://schemas.microsoft.com/office/drawing/2014/main" id="{32C7CA46-892B-253A-3A28-7414E17B837B}"/>
               </a:ext>
             </a:extLst>
           </p:cNvPr>
@@ -2529,7 +2546,7 @@
           <a:bodyPr/>
           <a:lstStyle/>
           <a:p>
-            <a:fld id="{E30AF5A0-43BB-4336-8627-9123B9144D80}" type="slidenum">
+            <a:fld id="{CC057153-B650-4DEB-B370-79DDCFDCE934}" type="slidenum">
               <a:rPr lang="en-US" dirty="0"/>
               <a:t>‹#›</a:t>
             </a:fld>
@@ -2540,18 +2557,13 @@
     </p:spTree>
     <p:extLst>
       <p:ext uri="{BB962C8B-B14F-4D97-AF65-F5344CB8AC3E}">
-        <p14:creationId xmlns:p14="http://schemas.microsoft.com/office/powerpoint/2010/main" val="1546239999"/>
+        <p14:creationId xmlns:p14="http://schemas.microsoft.com/office/powerpoint/2010/main" val="3201263873"/>
       </p:ext>
     </p:extLst>
   </p:cSld>
   <p:clrMapOvr>
     <a:masterClrMapping/>
   </p:clrMapOvr>
-  <p:extLst>
-    <p:ext uri="{DCECCB84-F9BA-43D5-87BE-67443E8EF086}">
-      <p15:sldGuideLst xmlns:p15="http://schemas.microsoft.com/office/powerpoint/2012/main"/>
-    </p:ext>
-  </p:extLst>
 </p:sldLayout>
 </file>
 
@@ -2577,7 +2589,7 @@
           <p:cNvPr id="2" name="Title 1">
             <a:extLst>
               <a:ext uri="{FF2B5EF4-FFF2-40B4-BE49-F238E27FC236}">
-                <a16:creationId xmlns:a16="http://schemas.microsoft.com/office/drawing/2014/main" id="{139FE98B-EACF-4251-A8AF-0D9EDD17C664}"/>
+                <a16:creationId xmlns:a16="http://schemas.microsoft.com/office/drawing/2014/main" id="{EFB06A09-98CF-FAC2-3708-AECC4360C651}"/>
               </a:ext>
             </a:extLst>
           </p:cNvPr>
@@ -2590,15 +2602,17 @@
         </p:nvSpPr>
         <p:spPr>
           <a:xfrm>
-            <a:off x="683342" y="1066800"/>
-            <a:ext cx="4103431" cy="1317523"/>
+            <a:off x="594360" y="557784"/>
+            <a:ext cx="3595634" cy="2212313"/>
           </a:xfrm>
         </p:spPr>
         <p:txBody>
-          <a:bodyPr anchor="b"/>
+          <a:bodyPr anchor="t">
+            <a:normAutofit/>
+          </a:bodyPr>
           <a:lstStyle>
             <a:lvl1pPr>
-              <a:defRPr sz="3200"/>
+              <a:defRPr sz="2800"/>
             </a:lvl1pPr>
           </a:lstStyle>
           <a:p>
@@ -2614,7 +2628,7 @@
           <p:cNvPr id="3" name="Picture Placeholder 2">
             <a:extLst>
               <a:ext uri="{FF2B5EF4-FFF2-40B4-BE49-F238E27FC236}">
-                <a16:creationId xmlns:a16="http://schemas.microsoft.com/office/drawing/2014/main" id="{3905F473-761A-4002-AF70-9FF878D0139E}"/>
+                <a16:creationId xmlns:a16="http://schemas.microsoft.com/office/drawing/2014/main" id="{9571C769-CEC8-962A-01E6-15B0E056791E}"/>
               </a:ext>
             </a:extLst>
           </p:cNvPr>
@@ -2627,8 +2641,8 @@
         </p:nvSpPr>
         <p:spPr>
           <a:xfrm>
-            <a:off x="5183188" y="1066800"/>
-            <a:ext cx="6172200" cy="4794250"/>
+            <a:off x="5063319" y="657103"/>
+            <a:ext cx="6483687" cy="5555904"/>
           </a:xfrm>
         </p:spPr>
         <p:txBody>
@@ -2672,7 +2686,7 @@
             </a:lvl9pPr>
           </a:lstStyle>
           <a:p>
-            <a:endParaRPr lang="en-US" dirty="0"/>
+            <a:endParaRPr/>
           </a:p>
         </p:txBody>
       </p:sp>
@@ -2681,7 +2695,7 @@
           <p:cNvPr id="4" name="Text Placeholder 3">
             <a:extLst>
               <a:ext uri="{FF2B5EF4-FFF2-40B4-BE49-F238E27FC236}">
-                <a16:creationId xmlns:a16="http://schemas.microsoft.com/office/drawing/2014/main" id="{FA0C2E6A-F834-4540-BB00-E13CB45DC362}"/>
+                <a16:creationId xmlns:a16="http://schemas.microsoft.com/office/drawing/2014/main" id="{F32C4A61-EF2A-C5A5-B150-4448600B3937}"/>
               </a:ext>
             </a:extLst>
           </p:cNvPr>
@@ -2694,12 +2708,12 @@
         </p:nvSpPr>
         <p:spPr>
           <a:xfrm>
-            <a:off x="683342" y="2552700"/>
-            <a:ext cx="4103431" cy="3316288"/>
+            <a:off x="609601" y="2826137"/>
+            <a:ext cx="3585586" cy="3434638"/>
           </a:xfrm>
         </p:spPr>
         <p:txBody>
-          <a:bodyPr/>
+          <a:bodyPr anchor="b"/>
           <a:lstStyle>
             <a:lvl1pPr marL="0" indent="0">
               <a:buNone/>
@@ -2752,7 +2766,7 @@
           <p:cNvPr id="5" name="Date Placeholder 4">
             <a:extLst>
               <a:ext uri="{FF2B5EF4-FFF2-40B4-BE49-F238E27FC236}">
-                <a16:creationId xmlns:a16="http://schemas.microsoft.com/office/drawing/2014/main" id="{F0C38EAB-AD63-415C-B263-BA1D8FBE3CB0}"/>
+                <a16:creationId xmlns:a16="http://schemas.microsoft.com/office/drawing/2014/main" id="{920B235E-39C7-4C78-20EF-DB48ECD9CB90}"/>
               </a:ext>
             </a:extLst>
           </p:cNvPr>
@@ -2768,7 +2782,7 @@
           <a:bodyPr/>
           <a:lstStyle/>
           <a:p>
-            <a:fld id="{52E9884E-D945-496C-84BE-49C61F78F9EC}" type="datetimeFigureOut">
+            <a:fld id="{F39F93E5-AFB6-485C-8E3C-32F92A07875F}" type="datetimeFigureOut">
               <a:rPr lang="en-US" dirty="0"/>
               <a:t>1/11/2025</a:t>
             </a:fld>
@@ -2781,7 +2795,7 @@
           <p:cNvPr id="6" name="Footer Placeholder 5">
             <a:extLst>
               <a:ext uri="{FF2B5EF4-FFF2-40B4-BE49-F238E27FC236}">
-                <a16:creationId xmlns:a16="http://schemas.microsoft.com/office/drawing/2014/main" id="{422E5541-B6DE-45E8-BCFE-0DFC4F574079}"/>
+                <a16:creationId xmlns:a16="http://schemas.microsoft.com/office/drawing/2014/main" id="{7FDC75DA-9A78-9AB9-7171-95A08CC51C56}"/>
               </a:ext>
             </a:extLst>
           </p:cNvPr>
@@ -2810,7 +2824,7 @@
           <p:cNvPr id="7" name="Slide Number Placeholder 6">
             <a:extLst>
               <a:ext uri="{FF2B5EF4-FFF2-40B4-BE49-F238E27FC236}">
-                <a16:creationId xmlns:a16="http://schemas.microsoft.com/office/drawing/2014/main" id="{DBB78D45-289B-46AF-8CB9-E6150BEA17ED}"/>
+                <a16:creationId xmlns:a16="http://schemas.microsoft.com/office/drawing/2014/main" id="{5EFE1A03-DCCB-53C7-DBFE-2AD55C90591B}"/>
               </a:ext>
             </a:extLst>
           </p:cNvPr>
@@ -2826,7 +2840,7 @@
           <a:bodyPr/>
           <a:lstStyle/>
           <a:p>
-            <a:fld id="{E30AF5A0-43BB-4336-8627-9123B9144D80}" type="slidenum">
+            <a:fld id="{CC057153-B650-4DEB-B370-79DDCFDCE934}" type="slidenum">
               <a:rPr lang="en-US" dirty="0"/>
               <a:t>‹#›</a:t>
             </a:fld>
@@ -2837,18 +2851,13 @@
     </p:spTree>
     <p:extLst>
       <p:ext uri="{BB962C8B-B14F-4D97-AF65-F5344CB8AC3E}">
-        <p14:creationId xmlns:p14="http://schemas.microsoft.com/office/powerpoint/2010/main" val="3829585945"/>
+        <p14:creationId xmlns:p14="http://schemas.microsoft.com/office/powerpoint/2010/main" val="332909749"/>
       </p:ext>
     </p:extLst>
   </p:cSld>
   <p:clrMapOvr>
     <a:masterClrMapping/>
   </p:clrMapOvr>
-  <p:extLst>
-    <p:ext uri="{DCECCB84-F9BA-43D5-87BE-67443E8EF086}">
-      <p15:sldGuideLst xmlns:p15="http://schemas.microsoft.com/office/powerpoint/2012/main"/>
-    </p:ext>
-  </p:extLst>
 </p:sldLayout>
 </file>
 
@@ -2879,7 +2888,7 @@
           <p:cNvPr id="2" name="Title Placeholder 1">
             <a:extLst>
               <a:ext uri="{FF2B5EF4-FFF2-40B4-BE49-F238E27FC236}">
-                <a16:creationId xmlns:a16="http://schemas.microsoft.com/office/drawing/2014/main" id="{47A362AC-B59F-4AC7-B279-57DDD5336BCA}"/>
+                <a16:creationId xmlns:a16="http://schemas.microsoft.com/office/drawing/2014/main" id="{475BFB69-9245-EC58-F1DE-FEB625BD336A}"/>
               </a:ext>
             </a:extLst>
           </p:cNvPr>
@@ -2892,8 +2901,8 @@
         </p:nvSpPr>
         <p:spPr>
           <a:xfrm>
-            <a:off x="700635" y="922096"/>
-            <a:ext cx="10691265" cy="1371030"/>
+            <a:off x="612648" y="548640"/>
+            <a:ext cx="10653578" cy="1132258"/>
           </a:xfrm>
           <a:prstGeom prst="rect">
             <a:avLst/>
@@ -2917,7 +2926,7 @@
           <p:cNvPr id="3" name="Text Placeholder 2">
             <a:extLst>
               <a:ext uri="{FF2B5EF4-FFF2-40B4-BE49-F238E27FC236}">
-                <a16:creationId xmlns:a16="http://schemas.microsoft.com/office/drawing/2014/main" id="{0E6042DB-75BD-4EC1-B6D9-8A72EF940CAA}"/>
+                <a16:creationId xmlns:a16="http://schemas.microsoft.com/office/drawing/2014/main" id="{5516AFD5-5144-C460-0CA4-644BC4A93C02}"/>
               </a:ext>
             </a:extLst>
           </p:cNvPr>
@@ -2930,8 +2939,8 @@
         </p:nvSpPr>
         <p:spPr>
           <a:xfrm>
-            <a:off x="700635" y="2293126"/>
-            <a:ext cx="10691265" cy="3636088"/>
+            <a:off x="612647" y="1715532"/>
+            <a:ext cx="10653579" cy="4593828"/>
           </a:xfrm>
           <a:prstGeom prst="rect">
             <a:avLst/>
@@ -2984,7 +2993,7 @@
           <p:cNvPr id="4" name="Date Placeholder 3">
             <a:extLst>
               <a:ext uri="{FF2B5EF4-FFF2-40B4-BE49-F238E27FC236}">
-                <a16:creationId xmlns:a16="http://schemas.microsoft.com/office/drawing/2014/main" id="{21DD1378-7C96-4079-B44C-3D86B4657596}"/>
+                <a16:creationId xmlns:a16="http://schemas.microsoft.com/office/drawing/2014/main" id="{3995753E-AF8A-7E04-8A1A-205B755A0215}"/>
               </a:ext>
             </a:extLst>
           </p:cNvPr>
@@ -2997,8 +3006,8 @@
         </p:nvSpPr>
         <p:spPr>
           <a:xfrm>
-            <a:off x="8369448" y="6356350"/>
-            <a:ext cx="2592594" cy="365125"/>
+            <a:off x="137160" y="6453002"/>
+            <a:ext cx="3494314" cy="365125"/>
           </a:xfrm>
           <a:prstGeom prst="rect">
             <a:avLst/>
@@ -3007,100 +3016,8 @@
         <p:txBody>
           <a:bodyPr vert="horz" lIns="91440" tIns="45720" rIns="91440" bIns="45720" rtlCol="0" anchor="ctr"/>
           <a:lstStyle>
-            <a:lvl1pPr algn="r">
-              <a:defRPr sz="1050">
-                <a:solidFill>
-                  <a:schemeClr val="tx1"/>
-                </a:solidFill>
-                <a:latin typeface="+mj-lt"/>
-              </a:defRPr>
-            </a:lvl1pPr>
-          </a:lstStyle>
-          <a:p>
-            <a:fld id="{CD438618-DEE5-47CF-A8B2-A9E090D503CD}" type="datetimeFigureOut">
-              <a:rPr lang="en-US" dirty="0"/>
-              <a:t>1/11/2025</a:t>
-            </a:fld>
-            <a:endParaRPr lang="en-US" dirty="0"/>
-          </a:p>
-        </p:txBody>
-      </p:sp>
-      <p:sp>
-        <p:nvSpPr>
-          <p:cNvPr id="5" name="Footer Placeholder 4">
-            <a:extLst>
-              <a:ext uri="{FF2B5EF4-FFF2-40B4-BE49-F238E27FC236}">
-                <a16:creationId xmlns:a16="http://schemas.microsoft.com/office/drawing/2014/main" id="{D19B6B78-577F-43F5-BAEE-BF72484C9850}"/>
-              </a:ext>
-            </a:extLst>
-          </p:cNvPr>
-          <p:cNvSpPr>
-            <a:spLocks noGrp="1"/>
-          </p:cNvSpPr>
-          <p:nvPr>
-            <p:ph type="ftr" sz="quarter" idx="3"/>
-          </p:nvPr>
-        </p:nvSpPr>
-        <p:spPr>
-          <a:xfrm>
-            <a:off x="715383" y="6356350"/>
-            <a:ext cx="4539727" cy="365125"/>
-          </a:xfrm>
-          <a:prstGeom prst="rect">
-            <a:avLst/>
-          </a:prstGeom>
-        </p:spPr>
-        <p:txBody>
-          <a:bodyPr vert="horz" lIns="91440" tIns="45720" rIns="91440" bIns="45720" rtlCol="0" anchor="ctr"/>
-          <a:lstStyle>
             <a:lvl1pPr algn="l">
-              <a:defRPr sz="1050">
-                <a:solidFill>
-                  <a:schemeClr val="tx1"/>
-                </a:solidFill>
-                <a:latin typeface="+mj-lt"/>
-              </a:defRPr>
-            </a:lvl1pPr>
-          </a:lstStyle>
-          <a:p>
-            <a:r>
-              <a:rPr lang="en-US" dirty="0"/>
-              <a:t>
-              </a:t>
-            </a:r>
-          </a:p>
-        </p:txBody>
-      </p:sp>
-      <p:sp>
-        <p:nvSpPr>
-          <p:cNvPr id="6" name="Slide Number Placeholder 5">
-            <a:extLst>
-              <a:ext uri="{FF2B5EF4-FFF2-40B4-BE49-F238E27FC236}">
-                <a16:creationId xmlns:a16="http://schemas.microsoft.com/office/drawing/2014/main" id="{A8CC75B8-AF8F-4D8A-9B3D-D1951A64BADB}"/>
-              </a:ext>
-            </a:extLst>
-          </p:cNvPr>
-          <p:cNvSpPr>
-            <a:spLocks noGrp="1"/>
-          </p:cNvSpPr>
-          <p:nvPr>
-            <p:ph type="sldNum" sz="quarter" idx="4"/>
-          </p:nvPr>
-        </p:nvSpPr>
-        <p:spPr>
-          <a:xfrm>
-            <a:off x="10919012" y="6356350"/>
-            <a:ext cx="672354" cy="365125"/>
-          </a:xfrm>
-          <a:prstGeom prst="rect">
-            <a:avLst/>
-          </a:prstGeom>
-        </p:spPr>
-        <p:txBody>
-          <a:bodyPr vert="horz" lIns="91440" tIns="45720" rIns="91440" bIns="45720" rtlCol="0" anchor="ctr"/>
-          <a:lstStyle>
-            <a:lvl1pPr algn="r">
-              <a:defRPr sz="1800">
+              <a:defRPr sz="900">
                 <a:solidFill>
                   <a:schemeClr val="tx1"/>
                 </a:solidFill>
@@ -3108,7 +3025,97 @@
             </a:lvl1pPr>
           </a:lstStyle>
           <a:p>
-            <a:fld id="{E30AF5A0-43BB-4336-8627-9123B9144D80}" type="slidenum">
+            <a:fld id="{3A332BE1-279E-4118-9FE3-7952B079A510}" type="datetimeFigureOut">
+              <a:rPr lang="en-US" dirty="0"/>
+              <a:t>1/11/2025</a:t>
+            </a:fld>
+            <a:endParaRPr lang="en-US" dirty="0"/>
+          </a:p>
+        </p:txBody>
+      </p:sp>
+      <p:sp>
+        <p:nvSpPr>
+          <p:cNvPr id="5" name="Footer Placeholder 4">
+            <a:extLst>
+              <a:ext uri="{FF2B5EF4-FFF2-40B4-BE49-F238E27FC236}">
+                <a16:creationId xmlns:a16="http://schemas.microsoft.com/office/drawing/2014/main" id="{D4E1B7C8-DA74-800B-EE14-A39E9DB32DE4}"/>
+              </a:ext>
+            </a:extLst>
+          </p:cNvPr>
+          <p:cNvSpPr>
+            <a:spLocks noGrp="1"/>
+          </p:cNvSpPr>
+          <p:nvPr>
+            <p:ph type="ftr" sz="quarter" idx="3"/>
+          </p:nvPr>
+        </p:nvSpPr>
+        <p:spPr>
+          <a:xfrm>
+            <a:off x="8876521" y="6453002"/>
+            <a:ext cx="2805405" cy="365125"/>
+          </a:xfrm>
+          <a:prstGeom prst="rect">
+            <a:avLst/>
+          </a:prstGeom>
+        </p:spPr>
+        <p:txBody>
+          <a:bodyPr vert="horz" lIns="91440" tIns="45720" rIns="91440" bIns="45720" rtlCol="0" anchor="ctr"/>
+          <a:lstStyle>
+            <a:lvl1pPr algn="r">
+              <a:defRPr sz="900">
+                <a:solidFill>
+                  <a:schemeClr val="tx1"/>
+                </a:solidFill>
+              </a:defRPr>
+            </a:lvl1pPr>
+          </a:lstStyle>
+          <a:p>
+            <a:r>
+              <a:rPr lang="en-US" dirty="0"/>
+              <a:t>
+              </a:t>
+            </a:r>
+          </a:p>
+        </p:txBody>
+      </p:sp>
+      <p:sp>
+        <p:nvSpPr>
+          <p:cNvPr id="6" name="Slide Number Placeholder 5">
+            <a:extLst>
+              <a:ext uri="{FF2B5EF4-FFF2-40B4-BE49-F238E27FC236}">
+                <a16:creationId xmlns:a16="http://schemas.microsoft.com/office/drawing/2014/main" id="{7AC1647D-0DF0-CA1B-F723-EF7B8F508DB7}"/>
+              </a:ext>
+            </a:extLst>
+          </p:cNvPr>
+          <p:cNvSpPr>
+            <a:spLocks noGrp="1"/>
+          </p:cNvSpPr>
+          <p:nvPr>
+            <p:ph type="sldNum" sz="quarter" idx="4"/>
+          </p:nvPr>
+        </p:nvSpPr>
+        <p:spPr>
+          <a:xfrm>
+            <a:off x="11632162" y="6453002"/>
+            <a:ext cx="429207" cy="365125"/>
+          </a:xfrm>
+          <a:prstGeom prst="rect">
+            <a:avLst/>
+          </a:prstGeom>
+        </p:spPr>
+        <p:txBody>
+          <a:bodyPr vert="horz" lIns="91440" tIns="45720" rIns="91440" bIns="45720" rtlCol="0" anchor="ctr"/>
+          <a:lstStyle>
+            <a:lvl1pPr algn="r">
+              <a:defRPr sz="900">
+                <a:solidFill>
+                  <a:schemeClr val="tx1"/>
+                </a:solidFill>
+              </a:defRPr>
+            </a:lvl1pPr>
+          </a:lstStyle>
+          <a:p>
+            <a:fld id="{CC057153-B650-4DEB-B370-79DDCFDCE934}" type="slidenum">
               <a:rPr lang="en-US" dirty="0"/>
               <a:t>‹#›</a:t>
             </a:fld>
@@ -3116,125 +3123,39 @@
           </a:p>
         </p:txBody>
       </p:sp>
-      <p:cxnSp>
-        <p:nvCxnSpPr>
-          <p:cNvPr id="7" name="Straight Connector 6">
-            <a:extLst>
-              <a:ext uri="{FF2B5EF4-FFF2-40B4-BE49-F238E27FC236}">
-                <a16:creationId xmlns:a16="http://schemas.microsoft.com/office/drawing/2014/main" id="{F64F9B95-9045-48D2-B9F3-2927E98F54AA}"/>
-              </a:ext>
-            </a:extLst>
-          </p:cNvPr>
-          <p:cNvCxnSpPr>
-            <a:cxnSpLocks/>
-          </p:cNvCxnSpPr>
-          <p:nvPr/>
-        </p:nvCxnSpPr>
-        <p:spPr>
-          <a:xfrm>
-            <a:off x="800100" y="723900"/>
-            <a:ext cx="10591800" cy="0"/>
-          </a:xfrm>
-          <a:prstGeom prst="line">
-            <a:avLst/>
-          </a:prstGeom>
-          <a:ln w="44450">
-            <a:solidFill>
-              <a:schemeClr val="tx1"/>
-            </a:solidFill>
-          </a:ln>
-        </p:spPr>
-        <p:style>
-          <a:lnRef idx="1">
-            <a:schemeClr val="accent1"/>
-          </a:lnRef>
-          <a:fillRef idx="0">
-            <a:schemeClr val="accent1"/>
-          </a:fillRef>
-          <a:effectRef idx="0">
-            <a:schemeClr val="accent1"/>
-          </a:effectRef>
-          <a:fontRef idx="minor">
-            <a:schemeClr val="tx1"/>
-          </a:fontRef>
-        </p:style>
-      </p:cxnSp>
-      <p:cxnSp>
-        <p:nvCxnSpPr>
-          <p:cNvPr id="8" name="Straight Connector 7">
-            <a:extLst>
-              <a:ext uri="{FF2B5EF4-FFF2-40B4-BE49-F238E27FC236}">
-                <a16:creationId xmlns:a16="http://schemas.microsoft.com/office/drawing/2014/main" id="{085AA86F-6A4D-4BCB-A045-D992CDC2959B}"/>
-              </a:ext>
-            </a:extLst>
-          </p:cNvPr>
-          <p:cNvCxnSpPr>
-            <a:cxnSpLocks/>
-          </p:cNvCxnSpPr>
-          <p:nvPr/>
-        </p:nvCxnSpPr>
-        <p:spPr>
-          <a:xfrm>
-            <a:off x="800100" y="6142781"/>
-            <a:ext cx="10591800" cy="0"/>
-          </a:xfrm>
-          <a:prstGeom prst="line">
-            <a:avLst/>
-          </a:prstGeom>
-          <a:ln w="12700">
-            <a:solidFill>
-              <a:schemeClr val="tx1"/>
-            </a:solidFill>
-          </a:ln>
-        </p:spPr>
-        <p:style>
-          <a:lnRef idx="1">
-            <a:schemeClr val="accent1"/>
-          </a:lnRef>
-          <a:fillRef idx="0">
-            <a:schemeClr val="accent1"/>
-          </a:fillRef>
-          <a:effectRef idx="0">
-            <a:schemeClr val="accent1"/>
-          </a:effectRef>
-          <a:fontRef idx="minor">
-            <a:schemeClr val="tx1"/>
-          </a:fontRef>
-        </p:style>
-      </p:cxnSp>
     </p:spTree>
     <p:extLst>
       <p:ext uri="{BB962C8B-B14F-4D97-AF65-F5344CB8AC3E}">
-        <p14:creationId xmlns:p14="http://schemas.microsoft.com/office/powerpoint/2010/main" val="2969919337"/>
+        <p14:creationId xmlns:p14="http://schemas.microsoft.com/office/powerpoint/2010/main" val="3907331828"/>
       </p:ext>
     </p:extLst>
   </p:cSld>
   <p:clrMap bg1="lt1" tx1="dk1" bg2="lt2" tx2="dk2" accent1="accent1" accent2="accent2" accent3="accent3" accent4="accent4" accent5="accent5" accent6="accent6" hlink="hlink" folHlink="folHlink"/>
   <p:sldLayoutIdLst>
-    <p:sldLayoutId id="2147483673" r:id="rId1"/>
-    <p:sldLayoutId id="2147483674" r:id="rId2"/>
-    <p:sldLayoutId id="2147483675" r:id="rId3"/>
-    <p:sldLayoutId id="2147483676" r:id="rId4"/>
-    <p:sldLayoutId id="2147483677" r:id="rId5"/>
-    <p:sldLayoutId id="2147483678" r:id="rId6"/>
-    <p:sldLayoutId id="2147483679" r:id="rId7"/>
-    <p:sldLayoutId id="2147483680" r:id="rId8"/>
-    <p:sldLayoutId id="2147483681" r:id="rId9"/>
-    <p:sldLayoutId id="2147483682" r:id="rId10"/>
-    <p:sldLayoutId id="2147483683" r:id="rId11"/>
+    <p:sldLayoutId id="2147483733" r:id="rId1"/>
+    <p:sldLayoutId id="2147483734" r:id="rId2"/>
+    <p:sldLayoutId id="2147483735" r:id="rId3"/>
+    <p:sldLayoutId id="2147483736" r:id="rId4"/>
+    <p:sldLayoutId id="2147483737" r:id="rId5"/>
+    <p:sldLayoutId id="2147483738" r:id="rId6"/>
+    <p:sldLayoutId id="2147483739" r:id="rId7"/>
+    <p:sldLayoutId id="2147483740" r:id="rId8"/>
+    <p:sldLayoutId id="2147483741" r:id="rId9"/>
+    <p:sldLayoutId id="2147483742" r:id="rId10"/>
+    <p:sldLayoutId id="2147483743" r:id="rId11"/>
   </p:sldLayoutIdLst>
   <p:hf hdr="0"/>
   <p:txStyles>
     <p:titleStyle>
       <a:lvl1pPr algn="l" defTabSz="914400" rtl="0" eaLnBrk="1" latinLnBrk="0" hangingPunct="1">
         <a:lnSpc>
-          <a:spcPct val="100000"/>
+          <a:spcPct val="90000"/>
         </a:lnSpc>
         <a:spcBef>
           <a:spcPct val="0"/>
         </a:spcBef>
         <a:buNone/>
-        <a:defRPr sz="4000" kern="1200" cap="all" spc="30" baseline="0">
+        <a:defRPr sz="3600" b="1" kern="1200">
           <a:solidFill>
             <a:schemeClr val="tx1"/>
           </a:solidFill>
@@ -3247,7 +3168,7 @@
     <p:bodyStyle>
       <a:lvl1pPr marL="228600" indent="-228600" algn="l" defTabSz="914400" rtl="0" eaLnBrk="1" latinLnBrk="0" hangingPunct="1">
         <a:lnSpc>
-          <a:spcPct val="110000"/>
+          <a:spcPct val="120000"/>
         </a:lnSpc>
         <a:spcBef>
           <a:spcPts val="1000"/>
@@ -3263,9 +3184,9 @@
           <a:cs typeface="+mn-cs"/>
         </a:defRPr>
       </a:lvl1pPr>
-      <a:lvl2pPr marL="685800" indent="-228600" algn="l" defTabSz="914400" rtl="0" eaLnBrk="1" latinLnBrk="0" hangingPunct="1">
+      <a:lvl2pPr marL="457200" indent="-228600" algn="l" defTabSz="914400" rtl="0" eaLnBrk="1" latinLnBrk="0" hangingPunct="1">
         <a:lnSpc>
-          <a:spcPct val="110000"/>
+          <a:spcPct val="120000"/>
         </a:lnSpc>
         <a:spcBef>
           <a:spcPts val="500"/>
@@ -3281,9 +3202,9 @@
           <a:cs typeface="+mn-cs"/>
         </a:defRPr>
       </a:lvl2pPr>
-      <a:lvl3pPr marL="1143000" indent="-228600" algn="l" defTabSz="914400" rtl="0" eaLnBrk="1" latinLnBrk="0" hangingPunct="1">
+      <a:lvl3pPr marL="685800" indent="-228600" algn="l" defTabSz="914400" rtl="0" eaLnBrk="1" latinLnBrk="0" hangingPunct="1">
         <a:lnSpc>
-          <a:spcPct val="110000"/>
+          <a:spcPct val="120000"/>
         </a:lnSpc>
         <a:spcBef>
           <a:spcPts val="500"/>
@@ -3299,9 +3220,9 @@
           <a:cs typeface="+mn-cs"/>
         </a:defRPr>
       </a:lvl3pPr>
-      <a:lvl4pPr marL="1600200" indent="-228600" algn="l" defTabSz="914400" rtl="0" eaLnBrk="1" latinLnBrk="0" hangingPunct="1">
+      <a:lvl4pPr marL="914400" indent="-228600" algn="l" defTabSz="914400" rtl="0" eaLnBrk="1" latinLnBrk="0" hangingPunct="1">
         <a:lnSpc>
-          <a:spcPct val="110000"/>
+          <a:spcPct val="120000"/>
         </a:lnSpc>
         <a:spcBef>
           <a:spcPts val="500"/>
@@ -3317,16 +3238,16 @@
           <a:cs typeface="+mn-cs"/>
         </a:defRPr>
       </a:lvl4pPr>
-      <a:lvl5pPr marL="2057400" indent="-228600" algn="l" defTabSz="914400" rtl="0" eaLnBrk="1" latinLnBrk="0" hangingPunct="1">
+      <a:lvl5pPr marL="1143000" indent="-228600" algn="l" defTabSz="914400" rtl="0" eaLnBrk="1" latinLnBrk="0" hangingPunct="1">
         <a:lnSpc>
-          <a:spcPct val="110000"/>
+          <a:spcPct val="120000"/>
         </a:lnSpc>
         <a:spcBef>
           <a:spcPts val="500"/>
         </a:spcBef>
         <a:buFont typeface="Arial" panose="020B0604020202020204" pitchFamily="34" charset="0"/>
         <a:buChar char="•"/>
-        <a:defRPr sz="1400" kern="1200">
+        <a:defRPr sz="1200" kern="1200">
           <a:solidFill>
             <a:schemeClr val="tx1"/>
           </a:solidFill>
@@ -3507,42 +3428,12 @@
   <p:extLst>
     <p:ext uri="{27BBF7A9-308A-43DC-89C8-2F10F3537804}">
       <p15:sldGuideLst xmlns:p15="http://schemas.microsoft.com/office/powerpoint/2012/main">
-        <p15:guide id="1" orient="horz" pos="2160">
+        <p15:guide id="5" orient="horz" pos="2160">
           <p15:clr>
             <a:srgbClr val="F26B43"/>
           </p15:clr>
         </p15:guide>
-        <p15:guide id="2" pos="3840">
-          <p15:clr>
-            <a:srgbClr val="F26B43"/>
-          </p15:clr>
-        </p15:guide>
-        <p15:guide id="3" orient="horz" pos="672">
-          <p15:clr>
-            <a:srgbClr val="F26B43"/>
-          </p15:clr>
-        </p15:guide>
-        <p15:guide id="4" orient="horz" pos="912">
-          <p15:clr>
-            <a:srgbClr val="F26B43"/>
-          </p15:clr>
-        </p15:guide>
-        <p15:guide id="5" pos="7176">
-          <p15:clr>
-            <a:srgbClr val="F26B43"/>
-          </p15:clr>
-        </p15:guide>
-        <p15:guide id="6" pos="504">
-          <p15:clr>
-            <a:srgbClr val="F26B43"/>
-          </p15:clr>
-        </p15:guide>
-        <p15:guide id="7" orient="horz" pos="3864">
-          <p15:clr>
-            <a:srgbClr val="F26B43"/>
-          </p15:clr>
-        </p15:guide>
-        <p15:guide id="8" orient="horz" pos="456">
+        <p15:guide id="6" pos="3840">
           <p15:clr>
             <a:srgbClr val="F26B43"/>
           </p15:clr>
@@ -3572,20 +3463,21 @@
       </p:grpSpPr>
       <p:sp>
         <p:nvSpPr>
-          <p:cNvPr id="2" name="Başlık 1"/>
-          <p:cNvSpPr>
-            <a:spLocks noGrp="1"/>
-          </p:cNvSpPr>
-          <p:nvPr>
-            <p:ph type="ctrTitle"/>
-          </p:nvPr>
-        </p:nvSpPr>
-        <p:spPr>
-          <a:xfrm>
-            <a:off x="678426" y="811379"/>
-            <a:ext cx="9989574" cy="3598606"/>
-          </a:xfrm>
-        </p:spPr>
+          <p:cNvPr id="2" name="Başlık 1">
+            <a:extLst>
+              <a:ext uri="{FF2B5EF4-FFF2-40B4-BE49-F238E27FC236}">
+                <a16:creationId xmlns:a16="http://schemas.microsoft.com/office/drawing/2014/main" id="{2F2A535A-4516-D426-1392-118825AEED03}"/>
+              </a:ext>
+            </a:extLst>
+          </p:cNvPr>
+          <p:cNvSpPr>
+            <a:spLocks noGrp="1"/>
+          </p:cNvSpPr>
+          <p:nvPr>
+            <p:ph type="title"/>
+          </p:nvPr>
+        </p:nvSpPr>
+        <p:spPr/>
         <p:txBody>
           <a:bodyPr/>
           <a:lstStyle/>
@@ -3593,41 +3485,719 @@
             <a:pPr algn="ctr"/>
             <a:r>
               <a:rPr lang="tr-TR" dirty="0"/>
-              <a:t>Latif Furkan Demir</a:t>
-            </a:r>
-            <a:br>
-              <a:rPr lang="tr-TR" dirty="0"/>
-            </a:br>
-            <a:r>
-              <a:rPr lang="tr-TR" sz="4400" dirty="0" err="1"/>
-              <a:t>bAHÇEŞEHİR</a:t>
-            </a:r>
-            <a:r>
-              <a:rPr lang="tr-TR" sz="4400" dirty="0"/>
-              <a:t> ÜNİVERSİTESİ  </a:t>
-            </a:r>
-            <a:br>
-              <a:rPr lang="tr-TR" sz="4400" dirty="0"/>
-            </a:br>
-            <a:r>
-              <a:rPr lang="tr-TR" sz="4400" dirty="0"/>
-              <a:t> </a:t>
-            </a:r>
-            <a:r>
-              <a:rPr lang="tr-TR" sz="4400" dirty="0" err="1"/>
-              <a:t>yAZILIM</a:t>
-            </a:r>
-            <a:r>
-              <a:rPr lang="tr-TR" sz="4400" dirty="0"/>
-              <a:t> MÜHENDİSLİĞİ</a:t>
-            </a:r>
+              <a:t>LATİF FURKAN DEMİR</a:t>
+            </a:r>
+            <a:endParaRPr lang="tr-TR"/>
+          </a:p>
+        </p:txBody>
+      </p:sp>
+      <p:sp>
+        <p:nvSpPr>
+          <p:cNvPr id="3" name="İçerik Yer Tutucusu 2">
+            <a:extLst>
+              <a:ext uri="{FF2B5EF4-FFF2-40B4-BE49-F238E27FC236}">
+                <a16:creationId xmlns:a16="http://schemas.microsoft.com/office/drawing/2014/main" id="{26C6EDD0-5841-3B24-96DA-6267E33769E6}"/>
+              </a:ext>
+            </a:extLst>
+          </p:cNvPr>
+          <p:cNvSpPr>
+            <a:spLocks noGrp="1"/>
+          </p:cNvSpPr>
+          <p:nvPr>
+            <p:ph idx="1"/>
+          </p:nvPr>
+        </p:nvSpPr>
+        <p:spPr/>
+        <p:txBody>
+          <a:bodyPr vert="horz" lIns="91440" tIns="45720" rIns="91440" bIns="45720" rtlCol="0" anchor="t">
+            <a:normAutofit/>
+          </a:bodyPr>
+          <a:lstStyle/>
+          <a:p>
+            <a:pPr marL="0" indent="0" algn="ctr">
+              <a:buNone/>
+            </a:pPr>
+            <a:r>
+              <a:rPr lang="tr-TR" sz="3200" dirty="0"/>
+              <a:t>BAHÇEŞEHİR ÜNİVERSİTESİ YAZILIM MÜHENDİSLİĞİ</a:t>
+            </a:r>
+          </a:p>
+        </p:txBody>
+      </p:sp>
+      <p:sp>
+        <p:nvSpPr>
+          <p:cNvPr id="4" name="Veri Yer Tutucusu 3">
+            <a:extLst>
+              <a:ext uri="{FF2B5EF4-FFF2-40B4-BE49-F238E27FC236}">
+                <a16:creationId xmlns:a16="http://schemas.microsoft.com/office/drawing/2014/main" id="{1144914C-469A-EA1F-CD62-4BDE6726F133}"/>
+              </a:ext>
+            </a:extLst>
+          </p:cNvPr>
+          <p:cNvSpPr>
+            <a:spLocks noGrp="1"/>
+          </p:cNvSpPr>
+          <p:nvPr>
+            <p:ph type="dt" sz="half" idx="10"/>
+          </p:nvPr>
+        </p:nvSpPr>
+        <p:spPr/>
+        <p:txBody>
+          <a:bodyPr/>
+          <a:lstStyle/>
+          <a:p>
+            <a:fld id="{6FA6890B-0A7B-4D84-953A-BD055E0EF49A}" type="datetime1">
+              <a:t>1/11/2025</a:t>
+            </a:fld>
+            <a:endParaRPr lang="en-US" dirty="0"/>
+          </a:p>
+        </p:txBody>
+      </p:sp>
+      <p:sp>
+        <p:nvSpPr>
+          <p:cNvPr id="5" name="Alt Bilgi Yer Tutucusu 4">
+            <a:extLst>
+              <a:ext uri="{FF2B5EF4-FFF2-40B4-BE49-F238E27FC236}">
+                <a16:creationId xmlns:a16="http://schemas.microsoft.com/office/drawing/2014/main" id="{DB70BB7D-41CA-756D-AED7-FC37B8F34B42}"/>
+              </a:ext>
+            </a:extLst>
+          </p:cNvPr>
+          <p:cNvSpPr>
+            <a:spLocks noGrp="1"/>
+          </p:cNvSpPr>
+          <p:nvPr>
+            <p:ph type="ftr" sz="quarter" idx="11"/>
+          </p:nvPr>
+        </p:nvSpPr>
+        <p:spPr/>
+        <p:txBody>
+          <a:bodyPr/>
+          <a:lstStyle/>
+          <a:p>
+            <a:r>
+              <a:rPr lang="en-US" dirty="0"/>
+              <a:t>
+              </a:t>
+            </a:r>
+          </a:p>
+        </p:txBody>
+      </p:sp>
+      <p:sp>
+        <p:nvSpPr>
+          <p:cNvPr id="6" name="Slayt Numarası Yer Tutucusu 5">
+            <a:extLst>
+              <a:ext uri="{FF2B5EF4-FFF2-40B4-BE49-F238E27FC236}">
+                <a16:creationId xmlns:a16="http://schemas.microsoft.com/office/drawing/2014/main" id="{C28B6F8B-7B24-EA50-D517-AF7835ABC86E}"/>
+              </a:ext>
+            </a:extLst>
+          </p:cNvPr>
+          <p:cNvSpPr>
+            <a:spLocks noGrp="1"/>
+          </p:cNvSpPr>
+          <p:nvPr>
+            <p:ph type="sldNum" sz="quarter" idx="12"/>
+          </p:nvPr>
+        </p:nvSpPr>
+        <p:spPr/>
+        <p:txBody>
+          <a:bodyPr/>
+          <a:lstStyle/>
+          <a:p>
+            <a:fld id="{70C12960-6E85-460F-B6E3-5B82CB31AF3D}" type="slidenum">
+              <a:rPr lang="en-US" dirty="0"/>
+              <a:t>1</a:t>
+            </a:fld>
+            <a:endParaRPr lang="en-US" dirty="0"/>
           </a:p>
         </p:txBody>
       </p:sp>
     </p:spTree>
     <p:extLst>
       <p:ext uri="{BB962C8B-B14F-4D97-AF65-F5344CB8AC3E}">
-        <p14:creationId xmlns:p14="http://schemas.microsoft.com/office/powerpoint/2010/main" val="1674425800"/>
+        <p14:creationId xmlns:p14="http://schemas.microsoft.com/office/powerpoint/2010/main" val="1486723850"/>
+      </p:ext>
+    </p:extLst>
+  </p:cSld>
+  <p:clrMapOvr>
+    <a:masterClrMapping/>
+  </p:clrMapOvr>
+</p:sld>
+</file>
+
+<file path=ppt/slides/slide10.xml><?xml version="1.0" encoding="utf-8"?>
+<p:sld xmlns:a="http://schemas.openxmlformats.org/drawingml/2006/main" xmlns:r="http://schemas.openxmlformats.org/officeDocument/2006/relationships" xmlns:p="http://schemas.openxmlformats.org/presentationml/2006/main">
+  <p:cSld>
+    <p:spTree>
+      <p:nvGrpSpPr>
+        <p:cNvPr id="1" name=""/>
+        <p:cNvGrpSpPr/>
+        <p:nvPr/>
+      </p:nvGrpSpPr>
+      <p:grpSpPr>
+        <a:xfrm>
+          <a:off x="0" y="0"/>
+          <a:ext cx="0" cy="0"/>
+          <a:chOff x="0" y="0"/>
+          <a:chExt cx="0" cy="0"/>
+        </a:xfrm>
+      </p:grpSpPr>
+      <p:sp>
+        <p:nvSpPr>
+          <p:cNvPr id="4" name="Veri Yer Tutucusu 3">
+            <a:extLst>
+              <a:ext uri="{FF2B5EF4-FFF2-40B4-BE49-F238E27FC236}">
+                <a16:creationId xmlns:a16="http://schemas.microsoft.com/office/drawing/2014/main" id="{208DBC44-C81C-4160-F16D-BB0AD488979C}"/>
+              </a:ext>
+            </a:extLst>
+          </p:cNvPr>
+          <p:cNvSpPr>
+            <a:spLocks noGrp="1"/>
+          </p:cNvSpPr>
+          <p:nvPr>
+            <p:ph type="dt" sz="half" idx="10"/>
+          </p:nvPr>
+        </p:nvSpPr>
+        <p:spPr/>
+        <p:txBody>
+          <a:bodyPr/>
+          <a:lstStyle/>
+          <a:p>
+            <a:fld id="{392065A8-311B-4DD9-A044-04EFB5C9E90E}" type="datetime1">
+              <a:t>1/11/2025</a:t>
+            </a:fld>
+            <a:endParaRPr lang="en-US" dirty="0"/>
+          </a:p>
+        </p:txBody>
+      </p:sp>
+      <p:sp>
+        <p:nvSpPr>
+          <p:cNvPr id="5" name="Alt Bilgi Yer Tutucusu 4">
+            <a:extLst>
+              <a:ext uri="{FF2B5EF4-FFF2-40B4-BE49-F238E27FC236}">
+                <a16:creationId xmlns:a16="http://schemas.microsoft.com/office/drawing/2014/main" id="{01D75DB7-9407-3892-69ED-B3D2761E167B}"/>
+              </a:ext>
+            </a:extLst>
+          </p:cNvPr>
+          <p:cNvSpPr>
+            <a:spLocks noGrp="1"/>
+          </p:cNvSpPr>
+          <p:nvPr>
+            <p:ph type="ftr" sz="quarter" idx="11"/>
+          </p:nvPr>
+        </p:nvSpPr>
+        <p:spPr/>
+        <p:txBody>
+          <a:bodyPr/>
+          <a:lstStyle/>
+          <a:p>
+            <a:r>
+              <a:rPr lang="en-US" dirty="0"/>
+              <a:t>
+              </a:t>
+            </a:r>
+          </a:p>
+        </p:txBody>
+      </p:sp>
+      <p:sp>
+        <p:nvSpPr>
+          <p:cNvPr id="6" name="Slayt Numarası Yer Tutucusu 5">
+            <a:extLst>
+              <a:ext uri="{FF2B5EF4-FFF2-40B4-BE49-F238E27FC236}">
+                <a16:creationId xmlns:a16="http://schemas.microsoft.com/office/drawing/2014/main" id="{F774851F-3840-E6C7-DFB2-92FC3B19E852}"/>
+              </a:ext>
+            </a:extLst>
+          </p:cNvPr>
+          <p:cNvSpPr>
+            <a:spLocks noGrp="1"/>
+          </p:cNvSpPr>
+          <p:nvPr>
+            <p:ph type="sldNum" sz="quarter" idx="12"/>
+          </p:nvPr>
+        </p:nvSpPr>
+        <p:spPr/>
+        <p:txBody>
+          <a:bodyPr/>
+          <a:lstStyle/>
+          <a:p>
+            <a:fld id="{CC057153-B650-4DEB-B370-79DDCFDCE934}" type="slidenum">
+              <a:rPr lang="en-US" dirty="0"/>
+              <a:t>10</a:t>
+            </a:fld>
+            <a:endParaRPr lang="en-US" dirty="0"/>
+          </a:p>
+        </p:txBody>
+      </p:sp>
+      <p:pic>
+        <p:nvPicPr>
+          <p:cNvPr id="7" name="Resim 6" descr="metin, ekran görüntüsü, yazılım, multimedya yazılımı içeren bir resim&#10;&#10;Açıklama otomatik olarak oluşturuldu">
+            <a:extLst>
+              <a:ext uri="{FF2B5EF4-FFF2-40B4-BE49-F238E27FC236}">
+                <a16:creationId xmlns:a16="http://schemas.microsoft.com/office/drawing/2014/main" id="{2BEF45C9-0F39-424A-9898-48FBF728EC9D}"/>
+              </a:ext>
+            </a:extLst>
+          </p:cNvPr>
+          <p:cNvPicPr>
+            <a:picLocks noChangeAspect="1"/>
+          </p:cNvPicPr>
+          <p:nvPr/>
+        </p:nvPicPr>
+        <p:blipFill>
+          <a:blip r:embed="rId2"/>
+          <a:stretch>
+            <a:fillRect/>
+          </a:stretch>
+        </p:blipFill>
+        <p:spPr>
+          <a:xfrm>
+            <a:off x="328660" y="0"/>
+            <a:ext cx="11534681" cy="6858000"/>
+          </a:xfrm>
+          <a:prstGeom prst="rect">
+            <a:avLst/>
+          </a:prstGeom>
+        </p:spPr>
+      </p:pic>
+    </p:spTree>
+    <p:extLst>
+      <p:ext uri="{BB962C8B-B14F-4D97-AF65-F5344CB8AC3E}">
+        <p14:creationId xmlns:p14="http://schemas.microsoft.com/office/powerpoint/2010/main" val="1689175357"/>
+      </p:ext>
+    </p:extLst>
+  </p:cSld>
+  <p:clrMapOvr>
+    <a:masterClrMapping/>
+  </p:clrMapOvr>
+</p:sld>
+</file>
+
+<file path=ppt/slides/slide11.xml><?xml version="1.0" encoding="utf-8"?>
+<p:sld xmlns:a="http://schemas.openxmlformats.org/drawingml/2006/main" xmlns:r="http://schemas.openxmlformats.org/officeDocument/2006/relationships" xmlns:p="http://schemas.openxmlformats.org/presentationml/2006/main">
+  <p:cSld>
+    <p:spTree>
+      <p:nvGrpSpPr>
+        <p:cNvPr id="1" name=""/>
+        <p:cNvGrpSpPr/>
+        <p:nvPr/>
+      </p:nvGrpSpPr>
+      <p:grpSpPr>
+        <a:xfrm>
+          <a:off x="0" y="0"/>
+          <a:ext cx="0" cy="0"/>
+          <a:chOff x="0" y="0"/>
+          <a:chExt cx="0" cy="0"/>
+        </a:xfrm>
+      </p:grpSpPr>
+      <p:sp>
+        <p:nvSpPr>
+          <p:cNvPr id="4" name="Veri Yer Tutucusu 3">
+            <a:extLst>
+              <a:ext uri="{FF2B5EF4-FFF2-40B4-BE49-F238E27FC236}">
+                <a16:creationId xmlns:a16="http://schemas.microsoft.com/office/drawing/2014/main" id="{080964AD-7946-B953-1FD0-86FFE748B075}"/>
+              </a:ext>
+            </a:extLst>
+          </p:cNvPr>
+          <p:cNvSpPr>
+            <a:spLocks noGrp="1"/>
+          </p:cNvSpPr>
+          <p:nvPr>
+            <p:ph type="dt" sz="half" idx="10"/>
+          </p:nvPr>
+        </p:nvSpPr>
+        <p:spPr/>
+        <p:txBody>
+          <a:bodyPr/>
+          <a:lstStyle/>
+          <a:p>
+            <a:fld id="{FAB3651F-0E1D-4097-948F-D91FF4574F28}" type="datetime1">
+              <a:t>1/11/2025</a:t>
+            </a:fld>
+            <a:endParaRPr lang="en-US" dirty="0"/>
+          </a:p>
+        </p:txBody>
+      </p:sp>
+      <p:sp>
+        <p:nvSpPr>
+          <p:cNvPr id="5" name="Alt Bilgi Yer Tutucusu 4">
+            <a:extLst>
+              <a:ext uri="{FF2B5EF4-FFF2-40B4-BE49-F238E27FC236}">
+                <a16:creationId xmlns:a16="http://schemas.microsoft.com/office/drawing/2014/main" id="{3C2BC380-A91D-74D4-C410-463E7305C116}"/>
+              </a:ext>
+            </a:extLst>
+          </p:cNvPr>
+          <p:cNvSpPr>
+            <a:spLocks noGrp="1"/>
+          </p:cNvSpPr>
+          <p:nvPr>
+            <p:ph type="ftr" sz="quarter" idx="11"/>
+          </p:nvPr>
+        </p:nvSpPr>
+        <p:spPr/>
+        <p:txBody>
+          <a:bodyPr/>
+          <a:lstStyle/>
+          <a:p>
+            <a:r>
+              <a:rPr lang="en-US" dirty="0"/>
+              <a:t>
+              </a:t>
+            </a:r>
+          </a:p>
+        </p:txBody>
+      </p:sp>
+      <p:sp>
+        <p:nvSpPr>
+          <p:cNvPr id="6" name="Slayt Numarası Yer Tutucusu 5">
+            <a:extLst>
+              <a:ext uri="{FF2B5EF4-FFF2-40B4-BE49-F238E27FC236}">
+                <a16:creationId xmlns:a16="http://schemas.microsoft.com/office/drawing/2014/main" id="{B5BA3F80-C6BD-E647-3D65-FD57067A922F}"/>
+              </a:ext>
+            </a:extLst>
+          </p:cNvPr>
+          <p:cNvSpPr>
+            <a:spLocks noGrp="1"/>
+          </p:cNvSpPr>
+          <p:nvPr>
+            <p:ph type="sldNum" sz="quarter" idx="12"/>
+          </p:nvPr>
+        </p:nvSpPr>
+        <p:spPr/>
+        <p:txBody>
+          <a:bodyPr/>
+          <a:lstStyle/>
+          <a:p>
+            <a:fld id="{CC057153-B650-4DEB-B370-79DDCFDCE934}" type="slidenum">
+              <a:rPr lang="en-US" dirty="0"/>
+              <a:t>11</a:t>
+            </a:fld>
+            <a:endParaRPr lang="en-US" dirty="0"/>
+          </a:p>
+        </p:txBody>
+      </p:sp>
+      <p:pic>
+        <p:nvPicPr>
+          <p:cNvPr id="10" name="Resim 9" descr="metin, ekran görüntüsü, yazılım, multimedya yazılımı içeren bir resim&#10;&#10;Açıklama otomatik olarak oluşturuldu">
+            <a:extLst>
+              <a:ext uri="{FF2B5EF4-FFF2-40B4-BE49-F238E27FC236}">
+                <a16:creationId xmlns:a16="http://schemas.microsoft.com/office/drawing/2014/main" id="{E001544F-9EA0-647D-BE2B-95C718F295C7}"/>
+              </a:ext>
+            </a:extLst>
+          </p:cNvPr>
+          <p:cNvPicPr>
+            <a:picLocks noChangeAspect="1"/>
+          </p:cNvPicPr>
+          <p:nvPr/>
+        </p:nvPicPr>
+        <p:blipFill>
+          <a:blip r:embed="rId2"/>
+          <a:stretch>
+            <a:fillRect/>
+          </a:stretch>
+        </p:blipFill>
+        <p:spPr>
+          <a:xfrm>
+            <a:off x="991173" y="0"/>
+            <a:ext cx="10209654" cy="6858000"/>
+          </a:xfrm>
+          <a:prstGeom prst="rect">
+            <a:avLst/>
+          </a:prstGeom>
+        </p:spPr>
+      </p:pic>
+    </p:spTree>
+    <p:extLst>
+      <p:ext uri="{BB962C8B-B14F-4D97-AF65-F5344CB8AC3E}">
+        <p14:creationId xmlns:p14="http://schemas.microsoft.com/office/powerpoint/2010/main" val="2642138244"/>
+      </p:ext>
+    </p:extLst>
+  </p:cSld>
+  <p:clrMapOvr>
+    <a:masterClrMapping/>
+  </p:clrMapOvr>
+</p:sld>
+</file>
+
+<file path=ppt/slides/slide12.xml><?xml version="1.0" encoding="utf-8"?>
+<p:sld xmlns:a="http://schemas.openxmlformats.org/drawingml/2006/main" xmlns:r="http://schemas.openxmlformats.org/officeDocument/2006/relationships" xmlns:p="http://schemas.openxmlformats.org/presentationml/2006/main">
+  <p:cSld>
+    <p:spTree>
+      <p:nvGrpSpPr>
+        <p:cNvPr id="1" name=""/>
+        <p:cNvGrpSpPr/>
+        <p:nvPr/>
+      </p:nvGrpSpPr>
+      <p:grpSpPr>
+        <a:xfrm>
+          <a:off x="0" y="0"/>
+          <a:ext cx="0" cy="0"/>
+          <a:chOff x="0" y="0"/>
+          <a:chExt cx="0" cy="0"/>
+        </a:xfrm>
+      </p:grpSpPr>
+      <p:sp>
+        <p:nvSpPr>
+          <p:cNvPr id="4" name="Veri Yer Tutucusu 3">
+            <a:extLst>
+              <a:ext uri="{FF2B5EF4-FFF2-40B4-BE49-F238E27FC236}">
+                <a16:creationId xmlns:a16="http://schemas.microsoft.com/office/drawing/2014/main" id="{9B0F0786-EC80-50D6-BC70-A1B41D467672}"/>
+              </a:ext>
+            </a:extLst>
+          </p:cNvPr>
+          <p:cNvSpPr>
+            <a:spLocks noGrp="1"/>
+          </p:cNvSpPr>
+          <p:nvPr>
+            <p:ph type="dt" sz="half" idx="10"/>
+          </p:nvPr>
+        </p:nvSpPr>
+        <p:spPr/>
+        <p:txBody>
+          <a:bodyPr/>
+          <a:lstStyle/>
+          <a:p>
+            <a:fld id="{1F917DA3-F7BC-4D90-8C52-ECC75C6BFDC5}" type="datetime1">
+              <a:t>1/11/2025</a:t>
+            </a:fld>
+            <a:endParaRPr lang="en-US" dirty="0"/>
+          </a:p>
+        </p:txBody>
+      </p:sp>
+      <p:sp>
+        <p:nvSpPr>
+          <p:cNvPr id="5" name="Alt Bilgi Yer Tutucusu 4">
+            <a:extLst>
+              <a:ext uri="{FF2B5EF4-FFF2-40B4-BE49-F238E27FC236}">
+                <a16:creationId xmlns:a16="http://schemas.microsoft.com/office/drawing/2014/main" id="{BF5A2023-4805-7C65-0356-73B640AB8762}"/>
+              </a:ext>
+            </a:extLst>
+          </p:cNvPr>
+          <p:cNvSpPr>
+            <a:spLocks noGrp="1"/>
+          </p:cNvSpPr>
+          <p:nvPr>
+            <p:ph type="ftr" sz="quarter" idx="11"/>
+          </p:nvPr>
+        </p:nvSpPr>
+        <p:spPr/>
+        <p:txBody>
+          <a:bodyPr/>
+          <a:lstStyle/>
+          <a:p>
+            <a:r>
+              <a:rPr lang="en-US" dirty="0"/>
+              <a:t>
+              </a:t>
+            </a:r>
+          </a:p>
+        </p:txBody>
+      </p:sp>
+      <p:sp>
+        <p:nvSpPr>
+          <p:cNvPr id="6" name="Slayt Numarası Yer Tutucusu 5">
+            <a:extLst>
+              <a:ext uri="{FF2B5EF4-FFF2-40B4-BE49-F238E27FC236}">
+                <a16:creationId xmlns:a16="http://schemas.microsoft.com/office/drawing/2014/main" id="{CDD3C1D8-2CE9-579A-93E2-4E8D7DF18D96}"/>
+              </a:ext>
+            </a:extLst>
+          </p:cNvPr>
+          <p:cNvSpPr>
+            <a:spLocks noGrp="1"/>
+          </p:cNvSpPr>
+          <p:nvPr>
+            <p:ph type="sldNum" sz="quarter" idx="12"/>
+          </p:nvPr>
+        </p:nvSpPr>
+        <p:spPr/>
+        <p:txBody>
+          <a:bodyPr/>
+          <a:lstStyle/>
+          <a:p>
+            <a:fld id="{CC057153-B650-4DEB-B370-79DDCFDCE934}" type="slidenum">
+              <a:rPr lang="en-US" dirty="0"/>
+              <a:t>12</a:t>
+            </a:fld>
+            <a:endParaRPr lang="en-US" dirty="0"/>
+          </a:p>
+        </p:txBody>
+      </p:sp>
+      <p:pic>
+        <p:nvPicPr>
+          <p:cNvPr id="7" name="Resim 6" descr="metin, ekran görüntüsü, yazılım, multimedya yazılımı içeren bir resim&#10;&#10;Açıklama otomatik olarak oluşturuldu">
+            <a:extLst>
+              <a:ext uri="{FF2B5EF4-FFF2-40B4-BE49-F238E27FC236}">
+                <a16:creationId xmlns:a16="http://schemas.microsoft.com/office/drawing/2014/main" id="{6FA58D3F-E2C7-17E4-7042-C9241EE2AED5}"/>
+              </a:ext>
+            </a:extLst>
+          </p:cNvPr>
+          <p:cNvPicPr>
+            <a:picLocks noChangeAspect="1"/>
+          </p:cNvPicPr>
+          <p:nvPr/>
+        </p:nvPicPr>
+        <p:blipFill>
+          <a:blip r:embed="rId2"/>
+          <a:stretch>
+            <a:fillRect/>
+          </a:stretch>
+        </p:blipFill>
+        <p:spPr>
+          <a:xfrm>
+            <a:off x="1013861" y="0"/>
+            <a:ext cx="10164278" cy="6858000"/>
+          </a:xfrm>
+          <a:prstGeom prst="rect">
+            <a:avLst/>
+          </a:prstGeom>
+        </p:spPr>
+      </p:pic>
+    </p:spTree>
+    <p:extLst>
+      <p:ext uri="{BB962C8B-B14F-4D97-AF65-F5344CB8AC3E}">
+        <p14:creationId xmlns:p14="http://schemas.microsoft.com/office/powerpoint/2010/main" val="2988441387"/>
+      </p:ext>
+    </p:extLst>
+  </p:cSld>
+  <p:clrMapOvr>
+    <a:masterClrMapping/>
+  </p:clrMapOvr>
+</p:sld>
+</file>
+
+<file path=ppt/slides/slide13.xml><?xml version="1.0" encoding="utf-8"?>
+<p:sld xmlns:a="http://schemas.openxmlformats.org/drawingml/2006/main" xmlns:r="http://schemas.openxmlformats.org/officeDocument/2006/relationships" xmlns:p="http://schemas.openxmlformats.org/presentationml/2006/main">
+  <p:cSld>
+    <p:spTree>
+      <p:nvGrpSpPr>
+        <p:cNvPr id="1" name=""/>
+        <p:cNvGrpSpPr/>
+        <p:nvPr/>
+      </p:nvGrpSpPr>
+      <p:grpSpPr>
+        <a:xfrm>
+          <a:off x="0" y="0"/>
+          <a:ext cx="0" cy="0"/>
+          <a:chOff x="0" y="0"/>
+          <a:chExt cx="0" cy="0"/>
+        </a:xfrm>
+      </p:grpSpPr>
+      <p:sp>
+        <p:nvSpPr>
+          <p:cNvPr id="4" name="Veri Yer Tutucusu 3">
+            <a:extLst>
+              <a:ext uri="{FF2B5EF4-FFF2-40B4-BE49-F238E27FC236}">
+                <a16:creationId xmlns:a16="http://schemas.microsoft.com/office/drawing/2014/main" id="{F0245F51-F146-3F84-8AC5-DF7D37C1E23A}"/>
+              </a:ext>
+            </a:extLst>
+          </p:cNvPr>
+          <p:cNvSpPr>
+            <a:spLocks noGrp="1"/>
+          </p:cNvSpPr>
+          <p:nvPr>
+            <p:ph type="dt" sz="half" idx="10"/>
+          </p:nvPr>
+        </p:nvSpPr>
+        <p:spPr/>
+        <p:txBody>
+          <a:bodyPr/>
+          <a:lstStyle/>
+          <a:p>
+            <a:fld id="{FE4531D6-7E86-4A76-9734-5DC79E606B93}" type="datetime1">
+              <a:t>1/11/2025</a:t>
+            </a:fld>
+            <a:endParaRPr lang="en-US" dirty="0"/>
+          </a:p>
+        </p:txBody>
+      </p:sp>
+      <p:sp>
+        <p:nvSpPr>
+          <p:cNvPr id="5" name="Alt Bilgi Yer Tutucusu 4">
+            <a:extLst>
+              <a:ext uri="{FF2B5EF4-FFF2-40B4-BE49-F238E27FC236}">
+                <a16:creationId xmlns:a16="http://schemas.microsoft.com/office/drawing/2014/main" id="{E80EEDA9-A908-DBA5-5427-D000F95E6D60}"/>
+              </a:ext>
+            </a:extLst>
+          </p:cNvPr>
+          <p:cNvSpPr>
+            <a:spLocks noGrp="1"/>
+          </p:cNvSpPr>
+          <p:nvPr>
+            <p:ph type="ftr" sz="quarter" idx="11"/>
+          </p:nvPr>
+        </p:nvSpPr>
+        <p:spPr/>
+        <p:txBody>
+          <a:bodyPr/>
+          <a:lstStyle/>
+          <a:p>
+            <a:r>
+              <a:rPr lang="en-US" dirty="0"/>
+              <a:t>
+              </a:t>
+            </a:r>
+          </a:p>
+        </p:txBody>
+      </p:sp>
+      <p:sp>
+        <p:nvSpPr>
+          <p:cNvPr id="6" name="Slayt Numarası Yer Tutucusu 5">
+            <a:extLst>
+              <a:ext uri="{FF2B5EF4-FFF2-40B4-BE49-F238E27FC236}">
+                <a16:creationId xmlns:a16="http://schemas.microsoft.com/office/drawing/2014/main" id="{76EB4DD3-1B7A-E51A-6B58-A487056E2926}"/>
+              </a:ext>
+            </a:extLst>
+          </p:cNvPr>
+          <p:cNvSpPr>
+            <a:spLocks noGrp="1"/>
+          </p:cNvSpPr>
+          <p:nvPr>
+            <p:ph type="sldNum" sz="quarter" idx="12"/>
+          </p:nvPr>
+        </p:nvSpPr>
+        <p:spPr/>
+        <p:txBody>
+          <a:bodyPr/>
+          <a:lstStyle/>
+          <a:p>
+            <a:fld id="{CC057153-B650-4DEB-B370-79DDCFDCE934}" type="slidenum">
+              <a:rPr lang="en-US" dirty="0"/>
+              <a:t>13</a:t>
+            </a:fld>
+            <a:endParaRPr lang="en-US" dirty="0"/>
+          </a:p>
+        </p:txBody>
+      </p:sp>
+      <p:pic>
+        <p:nvPicPr>
+          <p:cNvPr id="7" name="Resim 6" descr="metin, ekran görüntüsü, yazılım, multimedya yazılımı içeren bir resim&#10;&#10;Açıklama otomatik olarak oluşturuldu">
+            <a:extLst>
+              <a:ext uri="{FF2B5EF4-FFF2-40B4-BE49-F238E27FC236}">
+                <a16:creationId xmlns:a16="http://schemas.microsoft.com/office/drawing/2014/main" id="{7776B914-34E8-F651-3F2E-C1F1787A5AFE}"/>
+              </a:ext>
+            </a:extLst>
+          </p:cNvPr>
+          <p:cNvPicPr>
+            <a:picLocks noChangeAspect="1"/>
+          </p:cNvPicPr>
+          <p:nvPr/>
+        </p:nvPicPr>
+        <p:blipFill>
+          <a:blip r:embed="rId2"/>
+          <a:stretch>
+            <a:fillRect/>
+          </a:stretch>
+        </p:blipFill>
+        <p:spPr>
+          <a:xfrm>
+            <a:off x="995723" y="0"/>
+            <a:ext cx="10200555" cy="6858000"/>
+          </a:xfrm>
+          <a:prstGeom prst="rect">
+            <a:avLst/>
+          </a:prstGeom>
+        </p:spPr>
+      </p:pic>
+    </p:spTree>
+    <p:extLst>
+      <p:ext uri="{BB962C8B-B14F-4D97-AF65-F5344CB8AC3E}">
+        <p14:creationId xmlns:p14="http://schemas.microsoft.com/office/powerpoint/2010/main" val="64232006"/>
       </p:ext>
     </p:extLst>
   </p:cSld>
@@ -3656,49 +4226,103 @@
       </p:grpSpPr>
       <p:sp>
         <p:nvSpPr>
-          <p:cNvPr id="2" name="Başlık 1">
-            <a:extLst>
-              <a:ext uri="{FF2B5EF4-FFF2-40B4-BE49-F238E27FC236}">
-                <a16:creationId xmlns:a16="http://schemas.microsoft.com/office/drawing/2014/main" id="{573592C4-5416-70C9-7970-566D44E4E87E}"/>
-              </a:ext>
-            </a:extLst>
-          </p:cNvPr>
-          <p:cNvSpPr>
-            <a:spLocks noGrp="1"/>
-          </p:cNvSpPr>
-          <p:nvPr>
-            <p:ph type="title"/>
-          </p:nvPr>
-        </p:nvSpPr>
-        <p:spPr/>
-        <p:txBody>
-          <a:bodyPr/>
-          <a:lstStyle/>
-          <a:p>
-            <a:pPr algn="ctr"/>
-            <a:r>
-              <a:rPr lang="tr-TR"/>
-              <a:t>ENTITY SINIFLARI</a:t>
-            </a:r>
-            <a:endParaRPr lang="tr-TR" dirty="0"/>
+          <p:cNvPr id="4" name="Veri Yer Tutucusu 3">
+            <a:extLst>
+              <a:ext uri="{FF2B5EF4-FFF2-40B4-BE49-F238E27FC236}">
+                <a16:creationId xmlns:a16="http://schemas.microsoft.com/office/drawing/2014/main" id="{B1DF6F19-A3E7-E26D-77C0-D9175236D223}"/>
+              </a:ext>
+            </a:extLst>
+          </p:cNvPr>
+          <p:cNvSpPr>
+            <a:spLocks noGrp="1"/>
+          </p:cNvSpPr>
+          <p:nvPr>
+            <p:ph type="dt" sz="half" idx="10"/>
+          </p:nvPr>
+        </p:nvSpPr>
+        <p:spPr/>
+        <p:txBody>
+          <a:bodyPr/>
+          <a:lstStyle/>
+          <a:p>
+            <a:fld id="{91F40073-93D5-460F-87A5-D5E3AD37CCC5}" type="datetime1">
+              <a:t>1/11/2025</a:t>
+            </a:fld>
+            <a:endParaRPr lang="en-US" dirty="0"/>
+          </a:p>
+        </p:txBody>
+      </p:sp>
+      <p:sp>
+        <p:nvSpPr>
+          <p:cNvPr id="5" name="Alt Bilgi Yer Tutucusu 4">
+            <a:extLst>
+              <a:ext uri="{FF2B5EF4-FFF2-40B4-BE49-F238E27FC236}">
+                <a16:creationId xmlns:a16="http://schemas.microsoft.com/office/drawing/2014/main" id="{B4F66823-713F-40BF-D569-4D6E68216305}"/>
+              </a:ext>
+            </a:extLst>
+          </p:cNvPr>
+          <p:cNvSpPr>
+            <a:spLocks noGrp="1"/>
+          </p:cNvSpPr>
+          <p:nvPr>
+            <p:ph type="ftr" sz="quarter" idx="11"/>
+          </p:nvPr>
+        </p:nvSpPr>
+        <p:spPr/>
+        <p:txBody>
+          <a:bodyPr/>
+          <a:lstStyle/>
+          <a:p>
+            <a:r>
+              <a:rPr lang="en-US" dirty="0"/>
+              <a:t>
+              </a:t>
+            </a:r>
+          </a:p>
+        </p:txBody>
+      </p:sp>
+      <p:sp>
+        <p:nvSpPr>
+          <p:cNvPr id="6" name="Slayt Numarası Yer Tutucusu 5">
+            <a:extLst>
+              <a:ext uri="{FF2B5EF4-FFF2-40B4-BE49-F238E27FC236}">
+                <a16:creationId xmlns:a16="http://schemas.microsoft.com/office/drawing/2014/main" id="{21C5E3B0-CFEB-36D6-B733-86C610C8CDC3}"/>
+              </a:ext>
+            </a:extLst>
+          </p:cNvPr>
+          <p:cNvSpPr>
+            <a:spLocks noGrp="1"/>
+          </p:cNvSpPr>
+          <p:nvPr>
+            <p:ph type="sldNum" sz="quarter" idx="12"/>
+          </p:nvPr>
+        </p:nvSpPr>
+        <p:spPr/>
+        <p:txBody>
+          <a:bodyPr/>
+          <a:lstStyle/>
+          <a:p>
+            <a:fld id="{CC057153-B650-4DEB-B370-79DDCFDCE934}" type="slidenum">
+              <a:rPr lang="en-US" dirty="0"/>
+              <a:t>2</a:t>
+            </a:fld>
+            <a:endParaRPr lang="en-US" dirty="0"/>
           </a:p>
         </p:txBody>
       </p:sp>
       <p:pic>
         <p:nvPicPr>
-          <p:cNvPr id="7" name="İçerik Yer Tutucusu 6" descr="metin, ekran görüntüsü, yazı tipi, meneviş mavisi içeren bir resim&#10;&#10;Açıklama otomatik olarak oluşturuldu">
-            <a:extLst>
-              <a:ext uri="{FF2B5EF4-FFF2-40B4-BE49-F238E27FC236}">
-                <a16:creationId xmlns:a16="http://schemas.microsoft.com/office/drawing/2014/main" id="{5F8128B0-9ECC-436C-E7C9-4CA4981E6889}"/>
+          <p:cNvPr id="7" name="Resim 6" descr="metin, elektronik donanım, ekran görüntüsü, ekran, görüntüleme içeren bir resim&#10;&#10;Açıklama otomatik olarak oluşturuldu">
+            <a:extLst>
+              <a:ext uri="{FF2B5EF4-FFF2-40B4-BE49-F238E27FC236}">
+                <a16:creationId xmlns:a16="http://schemas.microsoft.com/office/drawing/2014/main" id="{FF83358A-0982-768E-2BF5-90FD33F6C572}"/>
               </a:ext>
             </a:extLst>
           </p:cNvPr>
           <p:cNvPicPr>
-            <a:picLocks noGrp="1" noChangeAspect="1"/>
+            <a:picLocks noChangeAspect="1"/>
           </p:cNvPicPr>
-          <p:nvPr>
-            <p:ph idx="1"/>
-          </p:nvPr>
+          <p:nvPr/>
         </p:nvPicPr>
         <p:blipFill>
           <a:blip r:embed="rId2"/>
@@ -3708,101 +4332,18 @@
         </p:blipFill>
         <p:spPr>
           <a:xfrm>
-            <a:off x="3088555" y="1787071"/>
-            <a:ext cx="6019799" cy="3276599"/>
+            <a:off x="0" y="14950"/>
+            <a:ext cx="12192000" cy="6828100"/>
           </a:xfrm>
+          <a:prstGeom prst="rect">
+            <a:avLst/>
+          </a:prstGeom>
         </p:spPr>
       </p:pic>
-      <p:sp>
-        <p:nvSpPr>
-          <p:cNvPr id="4" name="Veri Yer Tutucusu 3">
-            <a:extLst>
-              <a:ext uri="{FF2B5EF4-FFF2-40B4-BE49-F238E27FC236}">
-                <a16:creationId xmlns:a16="http://schemas.microsoft.com/office/drawing/2014/main" id="{42E8BF2D-1BF8-2B2A-E93E-5FD9935657C0}"/>
-              </a:ext>
-            </a:extLst>
-          </p:cNvPr>
-          <p:cNvSpPr>
-            <a:spLocks noGrp="1"/>
-          </p:cNvSpPr>
-          <p:nvPr>
-            <p:ph type="dt" sz="half" idx="10"/>
-          </p:nvPr>
-        </p:nvSpPr>
-        <p:spPr/>
-        <p:txBody>
-          <a:bodyPr/>
-          <a:lstStyle/>
-          <a:p>
-            <a:fld id="{B3212260-C659-40E6-956D-DA30E9AAB21B}" type="datetime1">
-              <a:t>11.01.2025</a:t>
-            </a:fld>
-            <a:endParaRPr lang="en-US" dirty="0"/>
-          </a:p>
-        </p:txBody>
-      </p:sp>
-      <p:sp>
-        <p:nvSpPr>
-          <p:cNvPr id="5" name="Alt Bilgi Yer Tutucusu 4">
-            <a:extLst>
-              <a:ext uri="{FF2B5EF4-FFF2-40B4-BE49-F238E27FC236}">
-                <a16:creationId xmlns:a16="http://schemas.microsoft.com/office/drawing/2014/main" id="{94C018B3-B0F2-FD9C-2AFB-3CB09B61C899}"/>
-              </a:ext>
-            </a:extLst>
-          </p:cNvPr>
-          <p:cNvSpPr>
-            <a:spLocks noGrp="1"/>
-          </p:cNvSpPr>
-          <p:nvPr>
-            <p:ph type="ftr" sz="quarter" idx="11"/>
-          </p:nvPr>
-        </p:nvSpPr>
-        <p:spPr/>
-        <p:txBody>
-          <a:bodyPr/>
-          <a:lstStyle/>
-          <a:p>
-            <a:r>
-              <a:rPr lang="en-US" dirty="0"/>
-              <a:t>
-              </a:t>
-            </a:r>
-          </a:p>
-        </p:txBody>
-      </p:sp>
-      <p:sp>
-        <p:nvSpPr>
-          <p:cNvPr id="6" name="Slayt Numarası Yer Tutucusu 5">
-            <a:extLst>
-              <a:ext uri="{FF2B5EF4-FFF2-40B4-BE49-F238E27FC236}">
-                <a16:creationId xmlns:a16="http://schemas.microsoft.com/office/drawing/2014/main" id="{22E93E96-7BDD-2631-085C-AF608412865E}"/>
-              </a:ext>
-            </a:extLst>
-          </p:cNvPr>
-          <p:cNvSpPr>
-            <a:spLocks noGrp="1"/>
-          </p:cNvSpPr>
-          <p:nvPr>
-            <p:ph type="sldNum" sz="quarter" idx="12"/>
-          </p:nvPr>
-        </p:nvSpPr>
-        <p:spPr/>
-        <p:txBody>
-          <a:bodyPr/>
-          <a:lstStyle/>
-          <a:p>
-            <a:fld id="{E30AF5A0-43BB-4336-8627-9123B9144D80}" type="slidenum">
-              <a:rPr lang="en-US" dirty="0"/>
-              <a:t>2</a:t>
-            </a:fld>
-            <a:endParaRPr lang="en-US" dirty="0"/>
-          </a:p>
-        </p:txBody>
-      </p:sp>
     </p:spTree>
     <p:extLst>
       <p:ext uri="{BB962C8B-B14F-4D97-AF65-F5344CB8AC3E}">
-        <p14:creationId xmlns:p14="http://schemas.microsoft.com/office/powerpoint/2010/main" val="3703627589"/>
+        <p14:creationId xmlns:p14="http://schemas.microsoft.com/office/powerpoint/2010/main" val="3240487479"/>
       </p:ext>
     </p:extLst>
   </p:cSld>
@@ -3831,69 +4372,10 @@
       </p:grpSpPr>
       <p:sp>
         <p:nvSpPr>
-          <p:cNvPr id="2" name="Başlık 1">
-            <a:extLst>
-              <a:ext uri="{FF2B5EF4-FFF2-40B4-BE49-F238E27FC236}">
-                <a16:creationId xmlns:a16="http://schemas.microsoft.com/office/drawing/2014/main" id="{29A97B42-585B-C51D-0739-A337530E2C9F}"/>
-              </a:ext>
-            </a:extLst>
-          </p:cNvPr>
-          <p:cNvSpPr>
-            <a:spLocks noGrp="1"/>
-          </p:cNvSpPr>
-          <p:nvPr>
-            <p:ph type="title"/>
-          </p:nvPr>
-        </p:nvSpPr>
-        <p:spPr/>
-        <p:txBody>
-          <a:bodyPr/>
-          <a:lstStyle/>
-          <a:p>
-            <a:pPr algn="ctr"/>
-            <a:r>
-              <a:rPr lang="tr-TR" err="1"/>
-              <a:t>Veritabanı</a:t>
-            </a:r>
-            <a:r>
-              <a:rPr lang="tr-TR" dirty="0"/>
-              <a:t> tabloları </a:t>
-            </a:r>
-            <a:endParaRPr lang="tr-TR"/>
-          </a:p>
-        </p:txBody>
-      </p:sp>
-      <p:sp>
-        <p:nvSpPr>
-          <p:cNvPr id="3" name="İçerik Yer Tutucusu 2">
-            <a:extLst>
-              <a:ext uri="{FF2B5EF4-FFF2-40B4-BE49-F238E27FC236}">
-                <a16:creationId xmlns:a16="http://schemas.microsoft.com/office/drawing/2014/main" id="{76992D2E-3A98-D289-2CDB-90A45C130149}"/>
-              </a:ext>
-            </a:extLst>
-          </p:cNvPr>
-          <p:cNvSpPr>
-            <a:spLocks noGrp="1"/>
-          </p:cNvSpPr>
-          <p:nvPr>
-            <p:ph idx="1"/>
-          </p:nvPr>
-        </p:nvSpPr>
-        <p:spPr/>
-        <p:txBody>
-          <a:bodyPr/>
-          <a:lstStyle/>
-          <a:p>
-            <a:endParaRPr lang="tr-TR"/>
-          </a:p>
-        </p:txBody>
-      </p:sp>
-      <p:sp>
-        <p:nvSpPr>
           <p:cNvPr id="4" name="Veri Yer Tutucusu 3">
             <a:extLst>
               <a:ext uri="{FF2B5EF4-FFF2-40B4-BE49-F238E27FC236}">
-                <a16:creationId xmlns:a16="http://schemas.microsoft.com/office/drawing/2014/main" id="{8D4054E0-007D-C5C7-971B-96829A7BD438}"/>
+                <a16:creationId xmlns:a16="http://schemas.microsoft.com/office/drawing/2014/main" id="{0227BA43-8E5A-E59E-9718-FDCFA09C1033}"/>
               </a:ext>
             </a:extLst>
           </p:cNvPr>
@@ -3909,8 +4391,8 @@
           <a:bodyPr/>
           <a:lstStyle/>
           <a:p>
-            <a:fld id="{D3B26A44-A1B0-4643-AB01-CDC16A1F8E63}" type="datetime1">
-              <a:t>11.01.2025</a:t>
+            <a:fld id="{EFE49941-A86C-4CE0-825A-CE790BB3D46E}" type="datetime1">
+              <a:t>1/11/2025</a:t>
             </a:fld>
             <a:endParaRPr lang="en-US" dirty="0"/>
           </a:p>
@@ -3921,7 +4403,7 @@
           <p:cNvPr id="5" name="Alt Bilgi Yer Tutucusu 4">
             <a:extLst>
               <a:ext uri="{FF2B5EF4-FFF2-40B4-BE49-F238E27FC236}">
-                <a16:creationId xmlns:a16="http://schemas.microsoft.com/office/drawing/2014/main" id="{8AC7D0AC-7B00-F336-0CF1-FE1FB0AC8FDE}"/>
+                <a16:creationId xmlns:a16="http://schemas.microsoft.com/office/drawing/2014/main" id="{6E86A5DD-B701-74B9-F912-3981B2CBEBF3}"/>
               </a:ext>
             </a:extLst>
           </p:cNvPr>
@@ -3950,7 +4432,7 @@
           <p:cNvPr id="6" name="Slayt Numarası Yer Tutucusu 5">
             <a:extLst>
               <a:ext uri="{FF2B5EF4-FFF2-40B4-BE49-F238E27FC236}">
-                <a16:creationId xmlns:a16="http://schemas.microsoft.com/office/drawing/2014/main" id="{0A8062A0-FDA1-9F41-B7F3-BFEFBB927ECA}"/>
+                <a16:creationId xmlns:a16="http://schemas.microsoft.com/office/drawing/2014/main" id="{873AAA34-2CCD-C87D-A252-25044B6876B0}"/>
               </a:ext>
             </a:extLst>
           </p:cNvPr>
@@ -3966,7 +4448,7 @@
           <a:bodyPr/>
           <a:lstStyle/>
           <a:p>
-            <a:fld id="{E30AF5A0-43BB-4336-8627-9123B9144D80}" type="slidenum">
+            <a:fld id="{CC057153-B650-4DEB-B370-79DDCFDCE934}" type="slidenum">
               <a:rPr lang="en-US" dirty="0"/>
               <a:t>3</a:t>
             </a:fld>
@@ -3974,10 +4456,916 @@
           </a:p>
         </p:txBody>
       </p:sp>
+      <p:pic>
+        <p:nvPicPr>
+          <p:cNvPr id="7" name="Resim 6" descr="metin, ekran görüntüsü, ekran, görüntüleme, yazılım içeren bir resim&#10;&#10;Açıklama otomatik olarak oluşturuldu">
+            <a:extLst>
+              <a:ext uri="{FF2B5EF4-FFF2-40B4-BE49-F238E27FC236}">
+                <a16:creationId xmlns:a16="http://schemas.microsoft.com/office/drawing/2014/main" id="{67E4527B-CEFD-2DAE-B154-397D22C43E41}"/>
+              </a:ext>
+            </a:extLst>
+          </p:cNvPr>
+          <p:cNvPicPr>
+            <a:picLocks noChangeAspect="1"/>
+          </p:cNvPicPr>
+          <p:nvPr/>
+        </p:nvPicPr>
+        <p:blipFill>
+          <a:blip r:embed="rId2"/>
+          <a:stretch>
+            <a:fillRect/>
+          </a:stretch>
+        </p:blipFill>
+        <p:spPr>
+          <a:xfrm>
+            <a:off x="0" y="15819"/>
+            <a:ext cx="12192000" cy="6826363"/>
+          </a:xfrm>
+          <a:prstGeom prst="rect">
+            <a:avLst/>
+          </a:prstGeom>
+        </p:spPr>
+      </p:pic>
     </p:spTree>
     <p:extLst>
       <p:ext uri="{BB962C8B-B14F-4D97-AF65-F5344CB8AC3E}">
-        <p14:creationId xmlns:p14="http://schemas.microsoft.com/office/powerpoint/2010/main" val="2536453317"/>
+        <p14:creationId xmlns:p14="http://schemas.microsoft.com/office/powerpoint/2010/main" val="2619604721"/>
+      </p:ext>
+    </p:extLst>
+  </p:cSld>
+  <p:clrMapOvr>
+    <a:masterClrMapping/>
+  </p:clrMapOvr>
+</p:sld>
+</file>
+
+<file path=ppt/slides/slide4.xml><?xml version="1.0" encoding="utf-8"?>
+<p:sld xmlns:a="http://schemas.openxmlformats.org/drawingml/2006/main" xmlns:r="http://schemas.openxmlformats.org/officeDocument/2006/relationships" xmlns:p="http://schemas.openxmlformats.org/presentationml/2006/main">
+  <p:cSld>
+    <p:spTree>
+      <p:nvGrpSpPr>
+        <p:cNvPr id="1" name=""/>
+        <p:cNvGrpSpPr/>
+        <p:nvPr/>
+      </p:nvGrpSpPr>
+      <p:grpSpPr>
+        <a:xfrm>
+          <a:off x="0" y="0"/>
+          <a:ext cx="0" cy="0"/>
+          <a:chOff x="0" y="0"/>
+          <a:chExt cx="0" cy="0"/>
+        </a:xfrm>
+      </p:grpSpPr>
+      <p:sp>
+        <p:nvSpPr>
+          <p:cNvPr id="4" name="Veri Yer Tutucusu 3">
+            <a:extLst>
+              <a:ext uri="{FF2B5EF4-FFF2-40B4-BE49-F238E27FC236}">
+                <a16:creationId xmlns:a16="http://schemas.microsoft.com/office/drawing/2014/main" id="{68311E46-A187-7D6C-AEEB-7BC614F5ADAF}"/>
+              </a:ext>
+            </a:extLst>
+          </p:cNvPr>
+          <p:cNvSpPr>
+            <a:spLocks noGrp="1"/>
+          </p:cNvSpPr>
+          <p:nvPr>
+            <p:ph type="dt" sz="half" idx="10"/>
+          </p:nvPr>
+        </p:nvSpPr>
+        <p:spPr/>
+        <p:txBody>
+          <a:bodyPr/>
+          <a:lstStyle/>
+          <a:p>
+            <a:fld id="{32D8BD42-5C02-4296-A2F7-025862637EFB}" type="datetime1">
+              <a:t>1/11/2025</a:t>
+            </a:fld>
+            <a:endParaRPr lang="en-US" dirty="0"/>
+          </a:p>
+        </p:txBody>
+      </p:sp>
+      <p:sp>
+        <p:nvSpPr>
+          <p:cNvPr id="5" name="Alt Bilgi Yer Tutucusu 4">
+            <a:extLst>
+              <a:ext uri="{FF2B5EF4-FFF2-40B4-BE49-F238E27FC236}">
+                <a16:creationId xmlns:a16="http://schemas.microsoft.com/office/drawing/2014/main" id="{DA363FF4-9104-C44B-6F94-3926CC400EBC}"/>
+              </a:ext>
+            </a:extLst>
+          </p:cNvPr>
+          <p:cNvSpPr>
+            <a:spLocks noGrp="1"/>
+          </p:cNvSpPr>
+          <p:nvPr>
+            <p:ph type="ftr" sz="quarter" idx="11"/>
+          </p:nvPr>
+        </p:nvSpPr>
+        <p:spPr/>
+        <p:txBody>
+          <a:bodyPr/>
+          <a:lstStyle/>
+          <a:p>
+            <a:r>
+              <a:rPr lang="en-US" dirty="0"/>
+              <a:t>
+              </a:t>
+            </a:r>
+          </a:p>
+        </p:txBody>
+      </p:sp>
+      <p:sp>
+        <p:nvSpPr>
+          <p:cNvPr id="6" name="Slayt Numarası Yer Tutucusu 5">
+            <a:extLst>
+              <a:ext uri="{FF2B5EF4-FFF2-40B4-BE49-F238E27FC236}">
+                <a16:creationId xmlns:a16="http://schemas.microsoft.com/office/drawing/2014/main" id="{9BDBF86F-1FC6-92A1-06DF-1E80843A5320}"/>
+              </a:ext>
+            </a:extLst>
+          </p:cNvPr>
+          <p:cNvSpPr>
+            <a:spLocks noGrp="1"/>
+          </p:cNvSpPr>
+          <p:nvPr>
+            <p:ph type="sldNum" sz="quarter" idx="12"/>
+          </p:nvPr>
+        </p:nvSpPr>
+        <p:spPr/>
+        <p:txBody>
+          <a:bodyPr/>
+          <a:lstStyle/>
+          <a:p>
+            <a:fld id="{CC057153-B650-4DEB-B370-79DDCFDCE934}" type="slidenum">
+              <a:rPr lang="en-US" dirty="0"/>
+              <a:t>4</a:t>
+            </a:fld>
+            <a:endParaRPr lang="en-US" dirty="0"/>
+          </a:p>
+        </p:txBody>
+      </p:sp>
+      <p:pic>
+        <p:nvPicPr>
+          <p:cNvPr id="7" name="Resim 6" descr="metin, elektronik donanım, ekran görüntüsü, ekran, görüntüleme içeren bir resim&#10;&#10;Açıklama otomatik olarak oluşturuldu">
+            <a:extLst>
+              <a:ext uri="{FF2B5EF4-FFF2-40B4-BE49-F238E27FC236}">
+                <a16:creationId xmlns:a16="http://schemas.microsoft.com/office/drawing/2014/main" id="{887EF705-9EB4-9729-44BD-8F51518272FD}"/>
+              </a:ext>
+            </a:extLst>
+          </p:cNvPr>
+          <p:cNvPicPr>
+            <a:picLocks noChangeAspect="1"/>
+          </p:cNvPicPr>
+          <p:nvPr/>
+        </p:nvPicPr>
+        <p:blipFill>
+          <a:blip r:embed="rId2"/>
+          <a:stretch>
+            <a:fillRect/>
+          </a:stretch>
+        </p:blipFill>
+        <p:spPr>
+          <a:xfrm>
+            <a:off x="186523" y="0"/>
+            <a:ext cx="11818954" cy="6858000"/>
+          </a:xfrm>
+          <a:prstGeom prst="rect">
+            <a:avLst/>
+          </a:prstGeom>
+        </p:spPr>
+      </p:pic>
+    </p:spTree>
+    <p:extLst>
+      <p:ext uri="{BB962C8B-B14F-4D97-AF65-F5344CB8AC3E}">
+        <p14:creationId xmlns:p14="http://schemas.microsoft.com/office/powerpoint/2010/main" val="3295888971"/>
+      </p:ext>
+    </p:extLst>
+  </p:cSld>
+  <p:clrMapOvr>
+    <a:masterClrMapping/>
+  </p:clrMapOvr>
+</p:sld>
+</file>
+
+<file path=ppt/slides/slide5.xml><?xml version="1.0" encoding="utf-8"?>
+<p:sld xmlns:a="http://schemas.openxmlformats.org/drawingml/2006/main" xmlns:r="http://schemas.openxmlformats.org/officeDocument/2006/relationships" xmlns:p="http://schemas.openxmlformats.org/presentationml/2006/main">
+  <p:cSld>
+    <p:spTree>
+      <p:nvGrpSpPr>
+        <p:cNvPr id="1" name=""/>
+        <p:cNvGrpSpPr/>
+        <p:nvPr/>
+      </p:nvGrpSpPr>
+      <p:grpSpPr>
+        <a:xfrm>
+          <a:off x="0" y="0"/>
+          <a:ext cx="0" cy="0"/>
+          <a:chOff x="0" y="0"/>
+          <a:chExt cx="0" cy="0"/>
+        </a:xfrm>
+      </p:grpSpPr>
+      <p:sp>
+        <p:nvSpPr>
+          <p:cNvPr id="4" name="Veri Yer Tutucusu 3">
+            <a:extLst>
+              <a:ext uri="{FF2B5EF4-FFF2-40B4-BE49-F238E27FC236}">
+                <a16:creationId xmlns:a16="http://schemas.microsoft.com/office/drawing/2014/main" id="{E8F8E46C-F4E1-4E12-B046-053F3AB3BB24}"/>
+              </a:ext>
+            </a:extLst>
+          </p:cNvPr>
+          <p:cNvSpPr>
+            <a:spLocks noGrp="1"/>
+          </p:cNvSpPr>
+          <p:nvPr>
+            <p:ph type="dt" sz="half" idx="10"/>
+          </p:nvPr>
+        </p:nvSpPr>
+        <p:spPr/>
+        <p:txBody>
+          <a:bodyPr/>
+          <a:lstStyle/>
+          <a:p>
+            <a:fld id="{BC5B9D9D-4462-4A74-9CFC-C9AAF33659E5}" type="datetime1">
+              <a:t>1/11/2025</a:t>
+            </a:fld>
+            <a:endParaRPr lang="en-US" dirty="0"/>
+          </a:p>
+        </p:txBody>
+      </p:sp>
+      <p:sp>
+        <p:nvSpPr>
+          <p:cNvPr id="5" name="Alt Bilgi Yer Tutucusu 4">
+            <a:extLst>
+              <a:ext uri="{FF2B5EF4-FFF2-40B4-BE49-F238E27FC236}">
+                <a16:creationId xmlns:a16="http://schemas.microsoft.com/office/drawing/2014/main" id="{36D1CF2D-4067-67CE-20C1-9A62266508F7}"/>
+              </a:ext>
+            </a:extLst>
+          </p:cNvPr>
+          <p:cNvSpPr>
+            <a:spLocks noGrp="1"/>
+          </p:cNvSpPr>
+          <p:nvPr>
+            <p:ph type="ftr" sz="quarter" idx="11"/>
+          </p:nvPr>
+        </p:nvSpPr>
+        <p:spPr/>
+        <p:txBody>
+          <a:bodyPr/>
+          <a:lstStyle/>
+          <a:p>
+            <a:r>
+              <a:rPr lang="en-US" dirty="0"/>
+              <a:t>
+              </a:t>
+            </a:r>
+          </a:p>
+        </p:txBody>
+      </p:sp>
+      <p:sp>
+        <p:nvSpPr>
+          <p:cNvPr id="6" name="Slayt Numarası Yer Tutucusu 5">
+            <a:extLst>
+              <a:ext uri="{FF2B5EF4-FFF2-40B4-BE49-F238E27FC236}">
+                <a16:creationId xmlns:a16="http://schemas.microsoft.com/office/drawing/2014/main" id="{E94C099B-411B-4AE5-5E37-4B1352182806}"/>
+              </a:ext>
+            </a:extLst>
+          </p:cNvPr>
+          <p:cNvSpPr>
+            <a:spLocks noGrp="1"/>
+          </p:cNvSpPr>
+          <p:nvPr>
+            <p:ph type="sldNum" sz="quarter" idx="12"/>
+          </p:nvPr>
+        </p:nvSpPr>
+        <p:spPr/>
+        <p:txBody>
+          <a:bodyPr/>
+          <a:lstStyle/>
+          <a:p>
+            <a:fld id="{CC057153-B650-4DEB-B370-79DDCFDCE934}" type="slidenum">
+              <a:rPr lang="en-US" dirty="0"/>
+              <a:t>5</a:t>
+            </a:fld>
+            <a:endParaRPr lang="en-US" dirty="0"/>
+          </a:p>
+        </p:txBody>
+      </p:sp>
+      <p:pic>
+        <p:nvPicPr>
+          <p:cNvPr id="7" name="Resim 6" descr="metin, ekran görüntüsü, yazılım, multimedya yazılımı içeren bir resim&#10;&#10;Açıklama otomatik olarak oluşturuldu">
+            <a:extLst>
+              <a:ext uri="{FF2B5EF4-FFF2-40B4-BE49-F238E27FC236}">
+                <a16:creationId xmlns:a16="http://schemas.microsoft.com/office/drawing/2014/main" id="{31A660BC-70AC-FE9D-A6B7-9C5C2DF4E063}"/>
+              </a:ext>
+            </a:extLst>
+          </p:cNvPr>
+          <p:cNvPicPr>
+            <a:picLocks noChangeAspect="1"/>
+          </p:cNvPicPr>
+          <p:nvPr/>
+        </p:nvPicPr>
+        <p:blipFill>
+          <a:blip r:embed="rId2"/>
+          <a:stretch>
+            <a:fillRect/>
+          </a:stretch>
+        </p:blipFill>
+        <p:spPr>
+          <a:xfrm>
+            <a:off x="1082414" y="0"/>
+            <a:ext cx="10027172" cy="6858000"/>
+          </a:xfrm>
+          <a:prstGeom prst="rect">
+            <a:avLst/>
+          </a:prstGeom>
+        </p:spPr>
+      </p:pic>
+    </p:spTree>
+    <p:extLst>
+      <p:ext uri="{BB962C8B-B14F-4D97-AF65-F5344CB8AC3E}">
+        <p14:creationId xmlns:p14="http://schemas.microsoft.com/office/powerpoint/2010/main" val="446949939"/>
+      </p:ext>
+    </p:extLst>
+  </p:cSld>
+  <p:clrMapOvr>
+    <a:masterClrMapping/>
+  </p:clrMapOvr>
+</p:sld>
+</file>
+
+<file path=ppt/slides/slide6.xml><?xml version="1.0" encoding="utf-8"?>
+<p:sld xmlns:a="http://schemas.openxmlformats.org/drawingml/2006/main" xmlns:r="http://schemas.openxmlformats.org/officeDocument/2006/relationships" xmlns:p="http://schemas.openxmlformats.org/presentationml/2006/main">
+  <p:cSld>
+    <p:spTree>
+      <p:nvGrpSpPr>
+        <p:cNvPr id="1" name=""/>
+        <p:cNvGrpSpPr/>
+        <p:nvPr/>
+      </p:nvGrpSpPr>
+      <p:grpSpPr>
+        <a:xfrm>
+          <a:off x="0" y="0"/>
+          <a:ext cx="0" cy="0"/>
+          <a:chOff x="0" y="0"/>
+          <a:chExt cx="0" cy="0"/>
+        </a:xfrm>
+      </p:grpSpPr>
+      <p:sp>
+        <p:nvSpPr>
+          <p:cNvPr id="4" name="Veri Yer Tutucusu 3">
+            <a:extLst>
+              <a:ext uri="{FF2B5EF4-FFF2-40B4-BE49-F238E27FC236}">
+                <a16:creationId xmlns:a16="http://schemas.microsoft.com/office/drawing/2014/main" id="{7AA7955A-CC3D-FB8B-ACC9-0E2F2DA06EC2}"/>
+              </a:ext>
+            </a:extLst>
+          </p:cNvPr>
+          <p:cNvSpPr>
+            <a:spLocks noGrp="1"/>
+          </p:cNvSpPr>
+          <p:nvPr>
+            <p:ph type="dt" sz="half" idx="10"/>
+          </p:nvPr>
+        </p:nvSpPr>
+        <p:spPr/>
+        <p:txBody>
+          <a:bodyPr/>
+          <a:lstStyle/>
+          <a:p>
+            <a:fld id="{7EA36ADE-A087-41C2-A35C-78B1C4CD24F4}" type="datetime1">
+              <a:t>1/11/2025</a:t>
+            </a:fld>
+            <a:endParaRPr lang="en-US" dirty="0"/>
+          </a:p>
+        </p:txBody>
+      </p:sp>
+      <p:sp>
+        <p:nvSpPr>
+          <p:cNvPr id="5" name="Alt Bilgi Yer Tutucusu 4">
+            <a:extLst>
+              <a:ext uri="{FF2B5EF4-FFF2-40B4-BE49-F238E27FC236}">
+                <a16:creationId xmlns:a16="http://schemas.microsoft.com/office/drawing/2014/main" id="{026C73B8-1181-98B5-BC8C-D4D4F80A673E}"/>
+              </a:ext>
+            </a:extLst>
+          </p:cNvPr>
+          <p:cNvSpPr>
+            <a:spLocks noGrp="1"/>
+          </p:cNvSpPr>
+          <p:nvPr>
+            <p:ph type="ftr" sz="quarter" idx="11"/>
+          </p:nvPr>
+        </p:nvSpPr>
+        <p:spPr/>
+        <p:txBody>
+          <a:bodyPr/>
+          <a:lstStyle/>
+          <a:p>
+            <a:r>
+              <a:rPr lang="en-US" dirty="0"/>
+              <a:t>
+              </a:t>
+            </a:r>
+          </a:p>
+        </p:txBody>
+      </p:sp>
+      <p:sp>
+        <p:nvSpPr>
+          <p:cNvPr id="6" name="Slayt Numarası Yer Tutucusu 5">
+            <a:extLst>
+              <a:ext uri="{FF2B5EF4-FFF2-40B4-BE49-F238E27FC236}">
+                <a16:creationId xmlns:a16="http://schemas.microsoft.com/office/drawing/2014/main" id="{14402071-9C84-862E-D7B2-91DA75F89C92}"/>
+              </a:ext>
+            </a:extLst>
+          </p:cNvPr>
+          <p:cNvSpPr>
+            <a:spLocks noGrp="1"/>
+          </p:cNvSpPr>
+          <p:nvPr>
+            <p:ph type="sldNum" sz="quarter" idx="12"/>
+          </p:nvPr>
+        </p:nvSpPr>
+        <p:spPr/>
+        <p:txBody>
+          <a:bodyPr/>
+          <a:lstStyle/>
+          <a:p>
+            <a:fld id="{CC057153-B650-4DEB-B370-79DDCFDCE934}" type="slidenum">
+              <a:rPr lang="en-US" dirty="0"/>
+              <a:t>6</a:t>
+            </a:fld>
+            <a:endParaRPr lang="en-US" dirty="0"/>
+          </a:p>
+        </p:txBody>
+      </p:sp>
+      <p:pic>
+        <p:nvPicPr>
+          <p:cNvPr id="7" name="Resim 6" descr="metin, ekran görüntüsü, yazılım, multimedya yazılımı içeren bir resim&#10;&#10;Açıklama otomatik olarak oluşturuldu">
+            <a:extLst>
+              <a:ext uri="{FF2B5EF4-FFF2-40B4-BE49-F238E27FC236}">
+                <a16:creationId xmlns:a16="http://schemas.microsoft.com/office/drawing/2014/main" id="{4AFEFD61-367D-1BA8-FFE9-4B5F605AF039}"/>
+              </a:ext>
+            </a:extLst>
+          </p:cNvPr>
+          <p:cNvPicPr>
+            <a:picLocks noChangeAspect="1"/>
+          </p:cNvPicPr>
+          <p:nvPr/>
+        </p:nvPicPr>
+        <p:blipFill>
+          <a:blip r:embed="rId2"/>
+          <a:stretch>
+            <a:fillRect/>
+          </a:stretch>
+        </p:blipFill>
+        <p:spPr>
+          <a:xfrm>
+            <a:off x="850984" y="0"/>
+            <a:ext cx="10490033" cy="6858000"/>
+          </a:xfrm>
+          <a:prstGeom prst="rect">
+            <a:avLst/>
+          </a:prstGeom>
+        </p:spPr>
+      </p:pic>
+    </p:spTree>
+    <p:extLst>
+      <p:ext uri="{BB962C8B-B14F-4D97-AF65-F5344CB8AC3E}">
+        <p14:creationId xmlns:p14="http://schemas.microsoft.com/office/powerpoint/2010/main" val="2812117174"/>
+      </p:ext>
+    </p:extLst>
+  </p:cSld>
+  <p:clrMapOvr>
+    <a:masterClrMapping/>
+  </p:clrMapOvr>
+</p:sld>
+</file>
+
+<file path=ppt/slides/slide7.xml><?xml version="1.0" encoding="utf-8"?>
+<p:sld xmlns:a="http://schemas.openxmlformats.org/drawingml/2006/main" xmlns:r="http://schemas.openxmlformats.org/officeDocument/2006/relationships" xmlns:p="http://schemas.openxmlformats.org/presentationml/2006/main">
+  <p:cSld>
+    <p:spTree>
+      <p:nvGrpSpPr>
+        <p:cNvPr id="1" name=""/>
+        <p:cNvGrpSpPr/>
+        <p:nvPr/>
+      </p:nvGrpSpPr>
+      <p:grpSpPr>
+        <a:xfrm>
+          <a:off x="0" y="0"/>
+          <a:ext cx="0" cy="0"/>
+          <a:chOff x="0" y="0"/>
+          <a:chExt cx="0" cy="0"/>
+        </a:xfrm>
+      </p:grpSpPr>
+      <p:sp>
+        <p:nvSpPr>
+          <p:cNvPr id="4" name="Veri Yer Tutucusu 3">
+            <a:extLst>
+              <a:ext uri="{FF2B5EF4-FFF2-40B4-BE49-F238E27FC236}">
+                <a16:creationId xmlns:a16="http://schemas.microsoft.com/office/drawing/2014/main" id="{FEA5C9E6-9A80-B260-BA11-990344EF6B55}"/>
+              </a:ext>
+            </a:extLst>
+          </p:cNvPr>
+          <p:cNvSpPr>
+            <a:spLocks noGrp="1"/>
+          </p:cNvSpPr>
+          <p:nvPr>
+            <p:ph type="dt" sz="half" idx="10"/>
+          </p:nvPr>
+        </p:nvSpPr>
+        <p:spPr/>
+        <p:txBody>
+          <a:bodyPr/>
+          <a:lstStyle/>
+          <a:p>
+            <a:fld id="{A25A3400-1567-4BFD-9A23-7621F18091EC}" type="datetime1">
+              <a:t>1/11/2025</a:t>
+            </a:fld>
+            <a:endParaRPr lang="en-US" dirty="0"/>
+          </a:p>
+        </p:txBody>
+      </p:sp>
+      <p:sp>
+        <p:nvSpPr>
+          <p:cNvPr id="5" name="Alt Bilgi Yer Tutucusu 4">
+            <a:extLst>
+              <a:ext uri="{FF2B5EF4-FFF2-40B4-BE49-F238E27FC236}">
+                <a16:creationId xmlns:a16="http://schemas.microsoft.com/office/drawing/2014/main" id="{AF56DB23-C069-C5F2-4A4D-CA27E217CC56}"/>
+              </a:ext>
+            </a:extLst>
+          </p:cNvPr>
+          <p:cNvSpPr>
+            <a:spLocks noGrp="1"/>
+          </p:cNvSpPr>
+          <p:nvPr>
+            <p:ph type="ftr" sz="quarter" idx="11"/>
+          </p:nvPr>
+        </p:nvSpPr>
+        <p:spPr/>
+        <p:txBody>
+          <a:bodyPr/>
+          <a:lstStyle/>
+          <a:p>
+            <a:r>
+              <a:rPr lang="en-US" dirty="0"/>
+              <a:t>
+              </a:t>
+            </a:r>
+          </a:p>
+        </p:txBody>
+      </p:sp>
+      <p:sp>
+        <p:nvSpPr>
+          <p:cNvPr id="6" name="Slayt Numarası Yer Tutucusu 5">
+            <a:extLst>
+              <a:ext uri="{FF2B5EF4-FFF2-40B4-BE49-F238E27FC236}">
+                <a16:creationId xmlns:a16="http://schemas.microsoft.com/office/drawing/2014/main" id="{B6882D97-2C9A-1787-36C4-390EC9BF7DA8}"/>
+              </a:ext>
+            </a:extLst>
+          </p:cNvPr>
+          <p:cNvSpPr>
+            <a:spLocks noGrp="1"/>
+          </p:cNvSpPr>
+          <p:nvPr>
+            <p:ph type="sldNum" sz="quarter" idx="12"/>
+          </p:nvPr>
+        </p:nvSpPr>
+        <p:spPr/>
+        <p:txBody>
+          <a:bodyPr/>
+          <a:lstStyle/>
+          <a:p>
+            <a:fld id="{CC057153-B650-4DEB-B370-79DDCFDCE934}" type="slidenum">
+              <a:rPr lang="en-US" dirty="0"/>
+              <a:t>7</a:t>
+            </a:fld>
+            <a:endParaRPr lang="en-US" dirty="0"/>
+          </a:p>
+        </p:txBody>
+      </p:sp>
+      <p:pic>
+        <p:nvPicPr>
+          <p:cNvPr id="7" name="Resim 6" descr="metin, ekran görüntüsü, yazılım, multimedya yazılımı içeren bir resim&#10;&#10;Açıklama otomatik olarak oluşturuldu">
+            <a:extLst>
+              <a:ext uri="{FF2B5EF4-FFF2-40B4-BE49-F238E27FC236}">
+                <a16:creationId xmlns:a16="http://schemas.microsoft.com/office/drawing/2014/main" id="{BFB7D84E-8B53-051C-E749-7DBC9E2DC94E}"/>
+              </a:ext>
+            </a:extLst>
+          </p:cNvPr>
+          <p:cNvPicPr>
+            <a:picLocks noChangeAspect="1"/>
+          </p:cNvPicPr>
+          <p:nvPr/>
+        </p:nvPicPr>
+        <p:blipFill>
+          <a:blip r:embed="rId2"/>
+          <a:stretch>
+            <a:fillRect/>
+          </a:stretch>
+        </p:blipFill>
+        <p:spPr>
+          <a:xfrm>
+            <a:off x="935746" y="0"/>
+            <a:ext cx="10320508" cy="6858000"/>
+          </a:xfrm>
+          <a:prstGeom prst="rect">
+            <a:avLst/>
+          </a:prstGeom>
+        </p:spPr>
+      </p:pic>
+    </p:spTree>
+    <p:extLst>
+      <p:ext uri="{BB962C8B-B14F-4D97-AF65-F5344CB8AC3E}">
+        <p14:creationId xmlns:p14="http://schemas.microsoft.com/office/powerpoint/2010/main" val="3479493950"/>
+      </p:ext>
+    </p:extLst>
+  </p:cSld>
+  <p:clrMapOvr>
+    <a:masterClrMapping/>
+  </p:clrMapOvr>
+</p:sld>
+</file>
+
+<file path=ppt/slides/slide8.xml><?xml version="1.0" encoding="utf-8"?>
+<p:sld xmlns:a="http://schemas.openxmlformats.org/drawingml/2006/main" xmlns:r="http://schemas.openxmlformats.org/officeDocument/2006/relationships" xmlns:p="http://schemas.openxmlformats.org/presentationml/2006/main">
+  <p:cSld>
+    <p:spTree>
+      <p:nvGrpSpPr>
+        <p:cNvPr id="1" name=""/>
+        <p:cNvGrpSpPr/>
+        <p:nvPr/>
+      </p:nvGrpSpPr>
+      <p:grpSpPr>
+        <a:xfrm>
+          <a:off x="0" y="0"/>
+          <a:ext cx="0" cy="0"/>
+          <a:chOff x="0" y="0"/>
+          <a:chExt cx="0" cy="0"/>
+        </a:xfrm>
+      </p:grpSpPr>
+      <p:sp>
+        <p:nvSpPr>
+          <p:cNvPr id="4" name="Veri Yer Tutucusu 3">
+            <a:extLst>
+              <a:ext uri="{FF2B5EF4-FFF2-40B4-BE49-F238E27FC236}">
+                <a16:creationId xmlns:a16="http://schemas.microsoft.com/office/drawing/2014/main" id="{70D0D8BD-41F7-CB24-42DC-1CDB877080CA}"/>
+              </a:ext>
+            </a:extLst>
+          </p:cNvPr>
+          <p:cNvSpPr>
+            <a:spLocks noGrp="1"/>
+          </p:cNvSpPr>
+          <p:nvPr>
+            <p:ph type="dt" sz="half" idx="10"/>
+          </p:nvPr>
+        </p:nvSpPr>
+        <p:spPr/>
+        <p:txBody>
+          <a:bodyPr/>
+          <a:lstStyle/>
+          <a:p>
+            <a:fld id="{C8DEFFA2-F40C-41A3-8DCB-DE09BF3F7C2E}" type="datetime1">
+              <a:t>1/11/2025</a:t>
+            </a:fld>
+            <a:endParaRPr lang="en-US" dirty="0"/>
+          </a:p>
+        </p:txBody>
+      </p:sp>
+      <p:sp>
+        <p:nvSpPr>
+          <p:cNvPr id="5" name="Alt Bilgi Yer Tutucusu 4">
+            <a:extLst>
+              <a:ext uri="{FF2B5EF4-FFF2-40B4-BE49-F238E27FC236}">
+                <a16:creationId xmlns:a16="http://schemas.microsoft.com/office/drawing/2014/main" id="{4FCBDB44-56E8-E485-AE4C-E3060C5ED020}"/>
+              </a:ext>
+            </a:extLst>
+          </p:cNvPr>
+          <p:cNvSpPr>
+            <a:spLocks noGrp="1"/>
+          </p:cNvSpPr>
+          <p:nvPr>
+            <p:ph type="ftr" sz="quarter" idx="11"/>
+          </p:nvPr>
+        </p:nvSpPr>
+        <p:spPr/>
+        <p:txBody>
+          <a:bodyPr/>
+          <a:lstStyle/>
+          <a:p>
+            <a:r>
+              <a:rPr lang="en-US" dirty="0"/>
+              <a:t>
+              </a:t>
+            </a:r>
+          </a:p>
+        </p:txBody>
+      </p:sp>
+      <p:sp>
+        <p:nvSpPr>
+          <p:cNvPr id="6" name="Slayt Numarası Yer Tutucusu 5">
+            <a:extLst>
+              <a:ext uri="{FF2B5EF4-FFF2-40B4-BE49-F238E27FC236}">
+                <a16:creationId xmlns:a16="http://schemas.microsoft.com/office/drawing/2014/main" id="{B534965B-E6DD-B7DD-AFFD-99A99322E7D8}"/>
+              </a:ext>
+            </a:extLst>
+          </p:cNvPr>
+          <p:cNvSpPr>
+            <a:spLocks noGrp="1"/>
+          </p:cNvSpPr>
+          <p:nvPr>
+            <p:ph type="sldNum" sz="quarter" idx="12"/>
+          </p:nvPr>
+        </p:nvSpPr>
+        <p:spPr/>
+        <p:txBody>
+          <a:bodyPr/>
+          <a:lstStyle/>
+          <a:p>
+            <a:fld id="{CC057153-B650-4DEB-B370-79DDCFDCE934}" type="slidenum">
+              <a:rPr lang="en-US" dirty="0"/>
+              <a:t>8</a:t>
+            </a:fld>
+            <a:endParaRPr lang="en-US" dirty="0"/>
+          </a:p>
+        </p:txBody>
+      </p:sp>
+      <p:pic>
+        <p:nvPicPr>
+          <p:cNvPr id="8" name="Resim 7" descr="metin, ekran görüntüsü, yazılım, multimedya yazılımı içeren bir resim&#10;&#10;Açıklama otomatik olarak oluşturuldu">
+            <a:extLst>
+              <a:ext uri="{FF2B5EF4-FFF2-40B4-BE49-F238E27FC236}">
+                <a16:creationId xmlns:a16="http://schemas.microsoft.com/office/drawing/2014/main" id="{788E498D-6FDE-32DA-117D-CBCE9026D547}"/>
+              </a:ext>
+            </a:extLst>
+          </p:cNvPr>
+          <p:cNvPicPr>
+            <a:picLocks noChangeAspect="1"/>
+          </p:cNvPicPr>
+          <p:nvPr/>
+        </p:nvPicPr>
+        <p:blipFill>
+          <a:blip r:embed="rId2"/>
+          <a:stretch>
+            <a:fillRect/>
+          </a:stretch>
+        </p:blipFill>
+        <p:spPr>
+          <a:xfrm>
+            <a:off x="747059" y="0"/>
+            <a:ext cx="10697882" cy="6858000"/>
+          </a:xfrm>
+          <a:prstGeom prst="rect">
+            <a:avLst/>
+          </a:prstGeom>
+        </p:spPr>
+      </p:pic>
+    </p:spTree>
+    <p:extLst>
+      <p:ext uri="{BB962C8B-B14F-4D97-AF65-F5344CB8AC3E}">
+        <p14:creationId xmlns:p14="http://schemas.microsoft.com/office/powerpoint/2010/main" val="1123442439"/>
+      </p:ext>
+    </p:extLst>
+  </p:cSld>
+  <p:clrMapOvr>
+    <a:masterClrMapping/>
+  </p:clrMapOvr>
+</p:sld>
+</file>
+
+<file path=ppt/slides/slide9.xml><?xml version="1.0" encoding="utf-8"?>
+<p:sld xmlns:a="http://schemas.openxmlformats.org/drawingml/2006/main" xmlns:r="http://schemas.openxmlformats.org/officeDocument/2006/relationships" xmlns:p="http://schemas.openxmlformats.org/presentationml/2006/main">
+  <p:cSld>
+    <p:spTree>
+      <p:nvGrpSpPr>
+        <p:cNvPr id="1" name=""/>
+        <p:cNvGrpSpPr/>
+        <p:nvPr/>
+      </p:nvGrpSpPr>
+      <p:grpSpPr>
+        <a:xfrm>
+          <a:off x="0" y="0"/>
+          <a:ext cx="0" cy="0"/>
+          <a:chOff x="0" y="0"/>
+          <a:chExt cx="0" cy="0"/>
+        </a:xfrm>
+      </p:grpSpPr>
+      <p:sp>
+        <p:nvSpPr>
+          <p:cNvPr id="4" name="Veri Yer Tutucusu 3">
+            <a:extLst>
+              <a:ext uri="{FF2B5EF4-FFF2-40B4-BE49-F238E27FC236}">
+                <a16:creationId xmlns:a16="http://schemas.microsoft.com/office/drawing/2014/main" id="{E4838B62-D7A9-63E5-4476-23A6D23B91DB}"/>
+              </a:ext>
+            </a:extLst>
+          </p:cNvPr>
+          <p:cNvSpPr>
+            <a:spLocks noGrp="1"/>
+          </p:cNvSpPr>
+          <p:nvPr>
+            <p:ph type="dt" sz="half" idx="10"/>
+          </p:nvPr>
+        </p:nvSpPr>
+        <p:spPr/>
+        <p:txBody>
+          <a:bodyPr/>
+          <a:lstStyle/>
+          <a:p>
+            <a:fld id="{ACF8974D-40EA-460F-9ABC-4E54CF6EA64A}" type="datetime1">
+              <a:t>1/11/2025</a:t>
+            </a:fld>
+            <a:endParaRPr lang="en-US" dirty="0"/>
+          </a:p>
+        </p:txBody>
+      </p:sp>
+      <p:sp>
+        <p:nvSpPr>
+          <p:cNvPr id="5" name="Alt Bilgi Yer Tutucusu 4">
+            <a:extLst>
+              <a:ext uri="{FF2B5EF4-FFF2-40B4-BE49-F238E27FC236}">
+                <a16:creationId xmlns:a16="http://schemas.microsoft.com/office/drawing/2014/main" id="{B91C9E57-9014-8045-F90C-E42030C3ACA2}"/>
+              </a:ext>
+            </a:extLst>
+          </p:cNvPr>
+          <p:cNvSpPr>
+            <a:spLocks noGrp="1"/>
+          </p:cNvSpPr>
+          <p:nvPr>
+            <p:ph type="ftr" sz="quarter" idx="11"/>
+          </p:nvPr>
+        </p:nvSpPr>
+        <p:spPr/>
+        <p:txBody>
+          <a:bodyPr/>
+          <a:lstStyle/>
+          <a:p>
+            <a:r>
+              <a:rPr lang="en-US" dirty="0"/>
+              <a:t>
+              </a:t>
+            </a:r>
+          </a:p>
+        </p:txBody>
+      </p:sp>
+      <p:sp>
+        <p:nvSpPr>
+          <p:cNvPr id="6" name="Slayt Numarası Yer Tutucusu 5">
+            <a:extLst>
+              <a:ext uri="{FF2B5EF4-FFF2-40B4-BE49-F238E27FC236}">
+                <a16:creationId xmlns:a16="http://schemas.microsoft.com/office/drawing/2014/main" id="{2FCD9FB2-C226-69E9-C0A4-9EC932444DD6}"/>
+              </a:ext>
+            </a:extLst>
+          </p:cNvPr>
+          <p:cNvSpPr>
+            <a:spLocks noGrp="1"/>
+          </p:cNvSpPr>
+          <p:nvPr>
+            <p:ph type="sldNum" sz="quarter" idx="12"/>
+          </p:nvPr>
+        </p:nvSpPr>
+        <p:spPr/>
+        <p:txBody>
+          <a:bodyPr/>
+          <a:lstStyle/>
+          <a:p>
+            <a:fld id="{CC057153-B650-4DEB-B370-79DDCFDCE934}" type="slidenum">
+              <a:rPr lang="en-US" dirty="0"/>
+              <a:t>9</a:t>
+            </a:fld>
+            <a:endParaRPr lang="en-US" dirty="0"/>
+          </a:p>
+        </p:txBody>
+      </p:sp>
+      <p:pic>
+        <p:nvPicPr>
+          <p:cNvPr id="7" name="Resim 6" descr="metin, ekran görüntüsü, yazılım, multimedya yazılımı içeren bir resim&#10;&#10;Açıklama otomatik olarak oluşturuldu">
+            <a:extLst>
+              <a:ext uri="{FF2B5EF4-FFF2-40B4-BE49-F238E27FC236}">
+                <a16:creationId xmlns:a16="http://schemas.microsoft.com/office/drawing/2014/main" id="{8FCFE3FD-6209-F4EF-4CD1-71A1EAB40996}"/>
+              </a:ext>
+            </a:extLst>
+          </p:cNvPr>
+          <p:cNvPicPr>
+            <a:picLocks noChangeAspect="1"/>
+          </p:cNvPicPr>
+          <p:nvPr/>
+        </p:nvPicPr>
+        <p:blipFill>
+          <a:blip r:embed="rId2"/>
+          <a:stretch>
+            <a:fillRect/>
+          </a:stretch>
+        </p:blipFill>
+        <p:spPr>
+          <a:xfrm>
+            <a:off x="957943" y="0"/>
+            <a:ext cx="10276114" cy="6858000"/>
+          </a:xfrm>
+          <a:prstGeom prst="rect">
+            <a:avLst/>
+          </a:prstGeom>
+        </p:spPr>
+      </p:pic>
+    </p:spTree>
+    <p:extLst>
+      <p:ext uri="{BB962C8B-B14F-4D97-AF65-F5344CB8AC3E}">
+        <p14:creationId xmlns:p14="http://schemas.microsoft.com/office/powerpoint/2010/main" val="2021346384"/>
       </p:ext>
     </p:extLst>
   </p:cSld>
@@ -3988,59 +5376,59 @@
 </file>
 
 <file path=ppt/theme/theme1.xml><?xml version="1.0" encoding="utf-8"?>
-<a:theme xmlns:a="http://schemas.openxmlformats.org/drawingml/2006/main" name="ChronicleVTI">
+<a:theme xmlns:a="http://schemas.openxmlformats.org/drawingml/2006/main" name="VanillaVTI">
   <a:themeElements>
-    <a:clrScheme name="ChronicleVTI">
+    <a:clrScheme name="VanillaVTI">
       <a:dk1>
-        <a:srgbClr val="000000"/>
+        <a:sysClr val="windowText" lastClr="000000"/>
       </a:dk1>
       <a:lt1>
-        <a:srgbClr val="FFFFFF"/>
+        <a:sysClr val="window" lastClr="FFFFFF"/>
       </a:lt1>
       <a:dk2>
-        <a:srgbClr val="1C1C32"/>
+        <a:srgbClr val="2C3932"/>
       </a:dk2>
       <a:lt2>
-        <a:srgbClr val="F8F4F1"/>
+        <a:srgbClr val="FDF6EA"/>
       </a:lt2>
       <a:accent1>
-        <a:srgbClr val="734B67"/>
+        <a:srgbClr val="169C9A"/>
       </a:accent1>
       <a:accent2>
-        <a:srgbClr val="959EBB"/>
+        <a:srgbClr val="FA9A42"/>
       </a:accent2>
       <a:accent3>
-        <a:srgbClr val="596781"/>
+        <a:srgbClr val="E15C3D"/>
       </a:accent3>
       <a:accent4>
-        <a:srgbClr val="7F6E8C"/>
+        <a:srgbClr val="E78A67"/>
       </a:accent4>
       <a:accent5>
-        <a:srgbClr val="DB9A8F"/>
+        <a:srgbClr val="A74B40"/>
       </a:accent5>
       <a:accent6>
-        <a:srgbClr val="C29AB1"/>
+        <a:srgbClr val="3D9072"/>
       </a:accent6>
       <a:hlink>
-        <a:srgbClr val="778BA2"/>
+        <a:srgbClr val="169C9A"/>
       </a:hlink>
       <a:folHlink>
-        <a:srgbClr val="A27C99"/>
+        <a:srgbClr val="E15C3D"/>
       </a:folHlink>
     </a:clrScheme>
-    <a:fontScheme name="ChronicleVTI">
+    <a:fontScheme name="VanillaVTI">
       <a:majorFont>
-        <a:latin typeface="Univers Condensed"/>
+        <a:latin typeface="Neue Haas Grotesk Text Pro"/>
         <a:ea typeface=""/>
         <a:cs typeface=""/>
       </a:majorFont>
       <a:minorFont>
-        <a:latin typeface="Calisto MT" panose="02040603050505030304"/>
+        <a:latin typeface="Neue Haas Grotesk Text Pro"/>
         <a:ea typeface=""/>
         <a:cs typeface=""/>
       </a:minorFont>
     </a:fontScheme>
-    <a:fmtScheme name="ChronicleVTI">
+    <a:fmtScheme name="VanillaVTI">
       <a:fillStyleLst>
         <a:solidFill>
           <a:schemeClr val="phClr"/>
@@ -4182,7 +5570,7 @@
   <a:extraClrSchemeLst/>
   <a:extLst>
     <a:ext uri="{05A4C25C-085E-4340-85A3-A5531E510DB2}">
-      <thm15:themeFamily xmlns:thm15="http://schemas.microsoft.com/office/thememl/2012/main" name="ChronicleVTI" id="{534FD3B1-53CD-4A5C-943C-C44DFF248C3E}" vid="{19A790DA-2E4D-4134-98A6-7DECB1A1B842}"/>
+      <thm15:themeFamily xmlns:thm15="http://schemas.microsoft.com/office/thememl/2012/main" name="VanillaVTI" id="{AACC6CF0-9F86-48CC-9C4E-CA578EE0A0A0}" vid="{3BDE51FE-56D6-4100-AFB5-5B4AEDCE2EF6}"/>
     </a:ext>
   </a:extLst>
 </a:theme>

</xml_diff>